<commit_message>
add ES getting started for both es deployment
</commit_message>
<xml_diff>
--- a/docs/diagrams.pptx
+++ b/docs/diagrams.pptx
@@ -6,19 +6,20 @@
     <p:sldMasterId id="2147483943" r:id="rId2"/>
   </p:sldMasterIdLst>
   <p:notesMasterIdLst>
-    <p:notesMasterId r:id="rId10"/>
+    <p:notesMasterId r:id="rId11"/>
   </p:notesMasterIdLst>
   <p:handoutMasterIdLst>
-    <p:handoutMasterId r:id="rId11"/>
+    <p:handoutMasterId r:id="rId12"/>
   </p:handoutMasterIdLst>
   <p:sldIdLst>
     <p:sldId id="141169019" r:id="rId3"/>
-    <p:sldId id="141169026" r:id="rId4"/>
-    <p:sldId id="141169025" r:id="rId5"/>
-    <p:sldId id="141169028" r:id="rId6"/>
-    <p:sldId id="141169029" r:id="rId7"/>
-    <p:sldId id="141169030" r:id="rId8"/>
-    <p:sldId id="141169027" r:id="rId9"/>
+    <p:sldId id="141169031" r:id="rId4"/>
+    <p:sldId id="141169026" r:id="rId5"/>
+    <p:sldId id="141169025" r:id="rId6"/>
+    <p:sldId id="141169028" r:id="rId7"/>
+    <p:sldId id="141169029" r:id="rId8"/>
+    <p:sldId id="141169030" r:id="rId9"/>
+    <p:sldId id="141169027" r:id="rId10"/>
   </p:sldIdLst>
   <p:sldSz cx="9144000" cy="5143500" type="screen16x9"/>
   <p:notesSz cx="6858000" cy="9144000"/>
@@ -221,7 +222,7 @@
           <a:p>
             <a:fld id="{43B1B1F9-D0CB-FF4D-BEE0-BED1F1FDA196}" type="datetimeFigureOut">
               <a:rPr lang="en-US" smtClean="0"/>
-              <a:t>5/14/20</a:t>
+              <a:t>5/15/20</a:t>
             </a:fld>
             <a:endParaRPr lang="en-US"/>
           </a:p>
@@ -386,7 +387,7 @@
           <a:p>
             <a:fld id="{26BE012A-D992-5D42-B86E-AA2BC0764EE1}" type="datetimeFigureOut">
               <a:rPr lang="en-US" smtClean="0"/>
-              <a:t>5/14/20</a:t>
+              <a:t>5/15/20</a:t>
             </a:fld>
             <a:endParaRPr lang="en-US"/>
           </a:p>
@@ -757,7 +758,7 @@
           <a:p>
             <a:fld id="{18D02FFD-07D4-5C4F-BD77-921008177348}" type="slidenum">
               <a:rPr lang="en-US" smtClean="0"/>
-              <a:t>3</a:t>
+              <a:t>4</a:t>
             </a:fld>
             <a:endParaRPr lang="en-US"/>
           </a:p>
@@ -880,7 +881,7 @@
           <a:p>
             <a:fld id="{18D02FFD-07D4-5C4F-BD77-921008177348}" type="slidenum">
               <a:rPr lang="en-US" smtClean="0"/>
-              <a:t>4</a:t>
+              <a:t>5</a:t>
             </a:fld>
             <a:endParaRPr lang="en-US"/>
           </a:p>
@@ -2889,14 +2890,14 @@
           </a:ln>
           <a:extLst>
             <a:ext uri="{909E8E84-426E-40dd-AFC4-6F175D3DCCD1}">
-              <a14:hiddenFill xmlns:a14="http://schemas.microsoft.com/office/drawing/2010/main" xmlns="">
+              <a14:hiddenFill xmlns="" xmlns:a14="http://schemas.microsoft.com/office/drawing/2010/main">
                 <a:solidFill>
                   <a:srgbClr val="FFFFFF"/>
                 </a:solidFill>
               </a14:hiddenFill>
             </a:ext>
             <a:ext uri="{91240B29-F687-4f45-9708-019B960494DF}">
-              <a14:hiddenLine xmlns:a14="http://schemas.microsoft.com/office/drawing/2010/main" xmlns="" w="9525">
+              <a14:hiddenLine xmlns="" xmlns:a14="http://schemas.microsoft.com/office/drawing/2010/main" w="9525">
                 <a:solidFill>
                   <a:srgbClr val="000000"/>
                 </a:solidFill>
@@ -2948,14 +2949,14 @@
           <a:effectLst/>
           <a:extLst>
             <a:ext uri="{909E8E84-426E-40dd-AFC4-6F175D3DCCD1}">
-              <a14:hiddenFill xmlns:a14="http://schemas.microsoft.com/office/drawing/2010/main" xmlns="">
+              <a14:hiddenFill xmlns="" xmlns:a14="http://schemas.microsoft.com/office/drawing/2010/main">
                 <a:solidFill>
                   <a:schemeClr val="accent1"/>
                 </a:solidFill>
               </a14:hiddenFill>
             </a:ext>
             <a:ext uri="{91240B29-F687-4f45-9708-019B960494DF}">
-              <a14:hiddenLine xmlns:a14="http://schemas.microsoft.com/office/drawing/2010/main" xmlns="" w="9525">
+              <a14:hiddenLine xmlns="" xmlns:a14="http://schemas.microsoft.com/office/drawing/2010/main" w="9525">
                 <a:solidFill>
                   <a:schemeClr val="tx1"/>
                 </a:solidFill>
@@ -2965,7 +2966,7 @@
               </a14:hiddenLine>
             </a:ext>
             <a:ext uri="{AF507438-7753-43e0-B8FC-AC1667EBCBE1}">
-              <a14:hiddenEffects xmlns:a14="http://schemas.microsoft.com/office/drawing/2010/main" xmlns="">
+              <a14:hiddenEffects xmlns="" xmlns:a14="http://schemas.microsoft.com/office/drawing/2010/main">
                 <a:effectLst>
                   <a:outerShdw blurRad="63500" dist="38099" dir="2700000" algn="ctr" rotWithShape="0">
                     <a:schemeClr val="bg2">
@@ -3681,10 +3682,10 @@
           </a:ln>
           <a:extLst>
             <a:ext uri="{FAA26D3D-D897-4be2-8F04-BA451C77F1D7}">
-              <ma14:placeholderFlag xmlns="" xmlns:ma14="http://schemas.microsoft.com/office/mac/drawingml/2011/main" val="1"/>
+              <ma14:placeholderFlag xmlns:ma14="http://schemas.microsoft.com/office/mac/drawingml/2011/main" xmlns="" val="1"/>
             </a:ext>
             <a:ext uri="{909E8E84-426E-40dd-AFC4-6F175D3DCCD1}">
-              <a14:hiddenFill xmlns="" xmlns:a14="http://schemas.microsoft.com/office/drawing/2010/main">
+              <a14:hiddenFill xmlns:a14="http://schemas.microsoft.com/office/drawing/2010/main" xmlns="">
                 <a:solidFill>
                   <a:srgbClr val="FFFFFF"/>
                 </a:solidFill>
@@ -3735,10 +3736,10 @@
           </a:ln>
           <a:extLst>
             <a:ext uri="{FAA26D3D-D897-4be2-8F04-BA451C77F1D7}">
-              <ma14:placeholderFlag xmlns="" xmlns:ma14="http://schemas.microsoft.com/office/mac/drawingml/2011/main" val="1"/>
+              <ma14:placeholderFlag xmlns:ma14="http://schemas.microsoft.com/office/mac/drawingml/2011/main" xmlns="" val="1"/>
             </a:ext>
             <a:ext uri="{909E8E84-426E-40dd-AFC4-6F175D3DCCD1}">
-              <a14:hiddenFill xmlns="" xmlns:a14="http://schemas.microsoft.com/office/drawing/2010/main">
+              <a14:hiddenFill xmlns:a14="http://schemas.microsoft.com/office/drawing/2010/main" xmlns="">
                 <a:solidFill>
                   <a:srgbClr val="FFFFFF"/>
                 </a:solidFill>
@@ -4624,6 +4625,2398 @@
               </a:rPr>
               <a:pPr/>
               <a:t>1</a:t>
+            </a:fld>
+            <a:endParaRPr lang="en-US">
+              <a:solidFill>
+                <a:srgbClr val="6D7777"/>
+              </a:solidFill>
+            </a:endParaRPr>
+          </a:p>
+        </p:txBody>
+      </p:sp>
+      <p:sp>
+        <p:nvSpPr>
+          <p:cNvPr id="5" name="Rectangle 4">
+            <a:extLst>
+              <a:ext uri="{FF2B5EF4-FFF2-40B4-BE49-F238E27FC236}">
+                <a16:creationId xmlns:a16="http://schemas.microsoft.com/office/drawing/2014/main" id="{A0F8AA87-8AA4-D045-B050-ED7AC92CDFC1}"/>
+              </a:ext>
+            </a:extLst>
+          </p:cNvPr>
+          <p:cNvSpPr/>
+          <p:nvPr/>
+        </p:nvSpPr>
+        <p:spPr>
+          <a:xfrm>
+            <a:off x="298411" y="1073443"/>
+            <a:ext cx="4008458" cy="2996614"/>
+          </a:xfrm>
+          <a:prstGeom prst="rect">
+            <a:avLst/>
+          </a:prstGeom>
+          <a:noFill/>
+          <a:ln>
+            <a:solidFill>
+              <a:srgbClr val="0000FF"/>
+            </a:solidFill>
+            <a:prstDash val="dash"/>
+          </a:ln>
+        </p:spPr>
+        <p:style>
+          <a:lnRef idx="2">
+            <a:schemeClr val="accent1">
+              <a:shade val="50000"/>
+            </a:schemeClr>
+          </a:lnRef>
+          <a:fillRef idx="1">
+            <a:schemeClr val="accent1"/>
+          </a:fillRef>
+          <a:effectRef idx="0">
+            <a:schemeClr val="accent1"/>
+          </a:effectRef>
+          <a:fontRef idx="minor">
+            <a:schemeClr val="lt1"/>
+          </a:fontRef>
+        </p:style>
+        <p:txBody>
+          <a:bodyPr rtlCol="0" anchor="t"/>
+          <a:lstStyle/>
+          <a:p>
+            <a:pPr algn="ctr" defTabSz="514350"/>
+            <a:r>
+              <a:rPr lang="en-US" sz="750" b="1">
+                <a:solidFill>
+                  <a:srgbClr val="0000FF"/>
+                </a:solidFill>
+                <a:latin typeface="Arial"/>
+              </a:rPr>
+              <a:t>On-Premise Environment</a:t>
+            </a:r>
+          </a:p>
+        </p:txBody>
+      </p:sp>
+      <p:sp>
+        <p:nvSpPr>
+          <p:cNvPr id="6" name="Rectangle 5">
+            <a:extLst>
+              <a:ext uri="{FF2B5EF4-FFF2-40B4-BE49-F238E27FC236}">
+                <a16:creationId xmlns:a16="http://schemas.microsoft.com/office/drawing/2014/main" id="{90B1E0CB-CD1E-D14F-9238-763E6AF8FC20}"/>
+              </a:ext>
+            </a:extLst>
+          </p:cNvPr>
+          <p:cNvSpPr/>
+          <p:nvPr/>
+        </p:nvSpPr>
+        <p:spPr>
+          <a:xfrm>
+            <a:off x="4710303" y="1073443"/>
+            <a:ext cx="3747898" cy="2996614"/>
+          </a:xfrm>
+          <a:prstGeom prst="rect">
+            <a:avLst/>
+          </a:prstGeom>
+          <a:noFill/>
+          <a:ln>
+            <a:solidFill>
+              <a:srgbClr val="00B050"/>
+            </a:solidFill>
+            <a:prstDash val="dash"/>
+          </a:ln>
+        </p:spPr>
+        <p:style>
+          <a:lnRef idx="2">
+            <a:schemeClr val="accent1">
+              <a:shade val="50000"/>
+            </a:schemeClr>
+          </a:lnRef>
+          <a:fillRef idx="1">
+            <a:schemeClr val="accent1"/>
+          </a:fillRef>
+          <a:effectRef idx="0">
+            <a:schemeClr val="accent1"/>
+          </a:effectRef>
+          <a:fontRef idx="minor">
+            <a:schemeClr val="lt1"/>
+          </a:fontRef>
+        </p:style>
+        <p:txBody>
+          <a:bodyPr rtlCol="0" anchor="t"/>
+          <a:lstStyle/>
+          <a:p>
+            <a:pPr algn="ctr" defTabSz="514350"/>
+            <a:r>
+              <a:rPr lang="en-US" sz="750" b="1">
+                <a:solidFill>
+                  <a:srgbClr val="00B050"/>
+                </a:solidFill>
+                <a:latin typeface="Arial"/>
+              </a:rPr>
+              <a:t>IBM Cloud</a:t>
+            </a:r>
+          </a:p>
+        </p:txBody>
+      </p:sp>
+      <p:sp>
+        <p:nvSpPr>
+          <p:cNvPr id="8" name="Rounded Rectangle 7">
+            <a:extLst>
+              <a:ext uri="{FF2B5EF4-FFF2-40B4-BE49-F238E27FC236}">
+                <a16:creationId xmlns:a16="http://schemas.microsoft.com/office/drawing/2014/main" id="{AF5BE487-0468-A243-9C73-9209F84D654B}"/>
+              </a:ext>
+            </a:extLst>
+          </p:cNvPr>
+          <p:cNvSpPr/>
+          <p:nvPr/>
+        </p:nvSpPr>
+        <p:spPr bwMode="auto">
+          <a:xfrm>
+            <a:off x="5547599" y="1634579"/>
+            <a:ext cx="138128" cy="411476"/>
+          </a:xfrm>
+          <a:prstGeom prst="roundRect">
+            <a:avLst/>
+          </a:prstGeom>
+          <a:solidFill>
+            <a:schemeClr val="bg1">
+              <a:lumMod val="50000"/>
+            </a:schemeClr>
+          </a:solidFill>
+          <a:ln>
+            <a:solidFill>
+              <a:schemeClr val="bg1"/>
+            </a:solidFill>
+            <a:prstDash val="solid"/>
+            <a:headEnd type="none" w="med" len="med"/>
+            <a:tailEnd type="none" w="med" len="med"/>
+          </a:ln>
+          <a:effectLst/>
+        </p:spPr>
+        <p:style>
+          <a:lnRef idx="1">
+            <a:schemeClr val="accent5"/>
+          </a:lnRef>
+          <a:fillRef idx="3">
+            <a:schemeClr val="accent5"/>
+          </a:fillRef>
+          <a:effectRef idx="2">
+            <a:schemeClr val="accent5"/>
+          </a:effectRef>
+          <a:fontRef idx="minor">
+            <a:schemeClr val="lt1"/>
+          </a:fontRef>
+        </p:style>
+        <p:txBody>
+          <a:bodyPr vert="horz" wrap="square" lIns="0" tIns="0" rIns="0" bIns="0" numCol="1" rtlCol="0" anchor="ctr" anchorCtr="0" compatLnSpc="1">
+            <a:prstTxWarp prst="textNoShape">
+              <a:avLst/>
+            </a:prstTxWarp>
+            <a:noAutofit/>
+          </a:bodyPr>
+          <a:lstStyle/>
+          <a:p>
+            <a:pPr algn="ctr" defTabSz="685784" fontAlgn="base">
+              <a:lnSpc>
+                <a:spcPct val="90000"/>
+              </a:lnSpc>
+              <a:spcBef>
+                <a:spcPct val="0"/>
+              </a:spcBef>
+              <a:spcAft>
+                <a:spcPct val="0"/>
+              </a:spcAft>
+            </a:pPr>
+            <a:r>
+              <a:rPr lang="en-US" sz="675">
+                <a:solidFill>
+                  <a:schemeClr val="bg1"/>
+                </a:solidFill>
+              </a:rPr>
+              <a:t>0</a:t>
+            </a:r>
+            <a:endParaRPr lang="en-US" sz="375">
+              <a:solidFill>
+                <a:schemeClr val="bg1"/>
+              </a:solidFill>
+            </a:endParaRPr>
+          </a:p>
+        </p:txBody>
+      </p:sp>
+      <p:sp>
+        <p:nvSpPr>
+          <p:cNvPr id="9" name="Rounded Rectangle 8">
+            <a:extLst>
+              <a:ext uri="{FF2B5EF4-FFF2-40B4-BE49-F238E27FC236}">
+                <a16:creationId xmlns:a16="http://schemas.microsoft.com/office/drawing/2014/main" id="{D5E58477-E1E3-594C-AF48-F4CA8530EABE}"/>
+              </a:ext>
+            </a:extLst>
+          </p:cNvPr>
+          <p:cNvSpPr/>
+          <p:nvPr/>
+        </p:nvSpPr>
+        <p:spPr bwMode="auto">
+          <a:xfrm>
+            <a:off x="5684757" y="1634579"/>
+            <a:ext cx="138128" cy="411476"/>
+          </a:xfrm>
+          <a:prstGeom prst="roundRect">
+            <a:avLst/>
+          </a:prstGeom>
+          <a:solidFill>
+            <a:schemeClr val="bg1">
+              <a:lumMod val="50000"/>
+            </a:schemeClr>
+          </a:solidFill>
+          <a:ln>
+            <a:solidFill>
+              <a:schemeClr val="bg1"/>
+            </a:solidFill>
+            <a:prstDash val="solid"/>
+            <a:headEnd type="none" w="med" len="med"/>
+            <a:tailEnd type="none" w="med" len="med"/>
+          </a:ln>
+          <a:effectLst/>
+        </p:spPr>
+        <p:style>
+          <a:lnRef idx="1">
+            <a:schemeClr val="accent5"/>
+          </a:lnRef>
+          <a:fillRef idx="3">
+            <a:schemeClr val="accent5"/>
+          </a:fillRef>
+          <a:effectRef idx="2">
+            <a:schemeClr val="accent5"/>
+          </a:effectRef>
+          <a:fontRef idx="minor">
+            <a:schemeClr val="lt1"/>
+          </a:fontRef>
+        </p:style>
+        <p:txBody>
+          <a:bodyPr vert="horz" wrap="square" lIns="0" tIns="0" rIns="0" bIns="0" numCol="1" rtlCol="0" anchor="ctr" anchorCtr="0" compatLnSpc="1">
+            <a:prstTxWarp prst="textNoShape">
+              <a:avLst/>
+            </a:prstTxWarp>
+            <a:noAutofit/>
+          </a:bodyPr>
+          <a:lstStyle/>
+          <a:p>
+            <a:pPr algn="ctr" defTabSz="685784" fontAlgn="base">
+              <a:lnSpc>
+                <a:spcPct val="90000"/>
+              </a:lnSpc>
+              <a:spcBef>
+                <a:spcPct val="0"/>
+              </a:spcBef>
+              <a:spcAft>
+                <a:spcPct val="0"/>
+              </a:spcAft>
+            </a:pPr>
+            <a:r>
+              <a:rPr lang="en-US" sz="675">
+                <a:solidFill>
+                  <a:schemeClr val="bg1"/>
+                </a:solidFill>
+              </a:rPr>
+              <a:t>1</a:t>
+            </a:r>
+            <a:endParaRPr lang="en-US" sz="375">
+              <a:solidFill>
+                <a:schemeClr val="bg1"/>
+              </a:solidFill>
+            </a:endParaRPr>
+          </a:p>
+        </p:txBody>
+      </p:sp>
+      <p:sp>
+        <p:nvSpPr>
+          <p:cNvPr id="10" name="Rounded Rectangle 9">
+            <a:extLst>
+              <a:ext uri="{FF2B5EF4-FFF2-40B4-BE49-F238E27FC236}">
+                <a16:creationId xmlns:a16="http://schemas.microsoft.com/office/drawing/2014/main" id="{F7310BC1-71B2-BD47-95DA-A5A9F09D389B}"/>
+              </a:ext>
+            </a:extLst>
+          </p:cNvPr>
+          <p:cNvSpPr/>
+          <p:nvPr/>
+        </p:nvSpPr>
+        <p:spPr bwMode="auto">
+          <a:xfrm>
+            <a:off x="5822886" y="1634579"/>
+            <a:ext cx="138128" cy="411476"/>
+          </a:xfrm>
+          <a:prstGeom prst="roundRect">
+            <a:avLst/>
+          </a:prstGeom>
+          <a:solidFill>
+            <a:schemeClr val="bg1">
+              <a:lumMod val="50000"/>
+            </a:schemeClr>
+          </a:solidFill>
+          <a:ln>
+            <a:solidFill>
+              <a:schemeClr val="bg1"/>
+            </a:solidFill>
+            <a:prstDash val="solid"/>
+            <a:headEnd type="none" w="med" len="med"/>
+            <a:tailEnd type="none" w="med" len="med"/>
+          </a:ln>
+          <a:effectLst/>
+        </p:spPr>
+        <p:style>
+          <a:lnRef idx="1">
+            <a:schemeClr val="accent5"/>
+          </a:lnRef>
+          <a:fillRef idx="3">
+            <a:schemeClr val="accent5"/>
+          </a:fillRef>
+          <a:effectRef idx="2">
+            <a:schemeClr val="accent5"/>
+          </a:effectRef>
+          <a:fontRef idx="minor">
+            <a:schemeClr val="lt1"/>
+          </a:fontRef>
+        </p:style>
+        <p:txBody>
+          <a:bodyPr vert="horz" wrap="square" lIns="0" tIns="0" rIns="0" bIns="0" numCol="1" rtlCol="0" anchor="ctr" anchorCtr="0" compatLnSpc="1">
+            <a:prstTxWarp prst="textNoShape">
+              <a:avLst/>
+            </a:prstTxWarp>
+            <a:noAutofit/>
+          </a:bodyPr>
+          <a:lstStyle/>
+          <a:p>
+            <a:pPr algn="ctr" defTabSz="685784" fontAlgn="base">
+              <a:lnSpc>
+                <a:spcPct val="90000"/>
+              </a:lnSpc>
+              <a:spcBef>
+                <a:spcPct val="0"/>
+              </a:spcBef>
+              <a:spcAft>
+                <a:spcPct val="0"/>
+              </a:spcAft>
+            </a:pPr>
+            <a:r>
+              <a:rPr lang="en-US" sz="675">
+                <a:solidFill>
+                  <a:schemeClr val="bg1"/>
+                </a:solidFill>
+              </a:rPr>
+              <a:t>2</a:t>
+            </a:r>
+            <a:endParaRPr lang="en-US" sz="375">
+              <a:solidFill>
+                <a:schemeClr val="bg1"/>
+              </a:solidFill>
+            </a:endParaRPr>
+          </a:p>
+        </p:txBody>
+      </p:sp>
+      <p:sp>
+        <p:nvSpPr>
+          <p:cNvPr id="11" name="Rounded Rectangle 10">
+            <a:extLst>
+              <a:ext uri="{FF2B5EF4-FFF2-40B4-BE49-F238E27FC236}">
+                <a16:creationId xmlns:a16="http://schemas.microsoft.com/office/drawing/2014/main" id="{B6291CC4-0B45-D044-90E7-3543E7A968CF}"/>
+              </a:ext>
+            </a:extLst>
+          </p:cNvPr>
+          <p:cNvSpPr/>
+          <p:nvPr/>
+        </p:nvSpPr>
+        <p:spPr bwMode="auto">
+          <a:xfrm>
+            <a:off x="5960044" y="1634579"/>
+            <a:ext cx="138128" cy="411476"/>
+          </a:xfrm>
+          <a:prstGeom prst="roundRect">
+            <a:avLst/>
+          </a:prstGeom>
+          <a:solidFill>
+            <a:schemeClr val="bg1">
+              <a:lumMod val="50000"/>
+            </a:schemeClr>
+          </a:solidFill>
+          <a:ln>
+            <a:solidFill>
+              <a:schemeClr val="bg1"/>
+            </a:solidFill>
+            <a:prstDash val="solid"/>
+            <a:headEnd type="none" w="med" len="med"/>
+            <a:tailEnd type="none" w="med" len="med"/>
+          </a:ln>
+          <a:effectLst/>
+        </p:spPr>
+        <p:style>
+          <a:lnRef idx="1">
+            <a:schemeClr val="accent5"/>
+          </a:lnRef>
+          <a:fillRef idx="3">
+            <a:schemeClr val="accent5"/>
+          </a:fillRef>
+          <a:effectRef idx="2">
+            <a:schemeClr val="accent5"/>
+          </a:effectRef>
+          <a:fontRef idx="minor">
+            <a:schemeClr val="lt1"/>
+          </a:fontRef>
+        </p:style>
+        <p:txBody>
+          <a:bodyPr vert="horz" wrap="square" lIns="0" tIns="0" rIns="0" bIns="0" numCol="1" rtlCol="0" anchor="ctr" anchorCtr="0" compatLnSpc="1">
+            <a:prstTxWarp prst="textNoShape">
+              <a:avLst/>
+            </a:prstTxWarp>
+            <a:noAutofit/>
+          </a:bodyPr>
+          <a:lstStyle/>
+          <a:p>
+            <a:pPr algn="ctr" defTabSz="685784" fontAlgn="base">
+              <a:lnSpc>
+                <a:spcPct val="90000"/>
+              </a:lnSpc>
+              <a:spcBef>
+                <a:spcPct val="0"/>
+              </a:spcBef>
+              <a:spcAft>
+                <a:spcPct val="0"/>
+              </a:spcAft>
+            </a:pPr>
+            <a:r>
+              <a:rPr lang="en-US" sz="675">
+                <a:solidFill>
+                  <a:schemeClr val="bg1"/>
+                </a:solidFill>
+              </a:rPr>
+              <a:t>3</a:t>
+            </a:r>
+            <a:endParaRPr lang="en-US" sz="375">
+              <a:solidFill>
+                <a:schemeClr val="bg1"/>
+              </a:solidFill>
+            </a:endParaRPr>
+          </a:p>
+        </p:txBody>
+      </p:sp>
+      <p:sp>
+        <p:nvSpPr>
+          <p:cNvPr id="12" name="Rounded Rectangle 11">
+            <a:extLst>
+              <a:ext uri="{FF2B5EF4-FFF2-40B4-BE49-F238E27FC236}">
+                <a16:creationId xmlns:a16="http://schemas.microsoft.com/office/drawing/2014/main" id="{94EF47BB-26F6-B343-B071-171636EE579D}"/>
+              </a:ext>
+            </a:extLst>
+          </p:cNvPr>
+          <p:cNvSpPr/>
+          <p:nvPr/>
+        </p:nvSpPr>
+        <p:spPr bwMode="auto">
+          <a:xfrm>
+            <a:off x="6098172" y="1634579"/>
+            <a:ext cx="138128" cy="411476"/>
+          </a:xfrm>
+          <a:prstGeom prst="roundRect">
+            <a:avLst/>
+          </a:prstGeom>
+          <a:solidFill>
+            <a:schemeClr val="bg1">
+              <a:lumMod val="50000"/>
+            </a:schemeClr>
+          </a:solidFill>
+          <a:ln>
+            <a:solidFill>
+              <a:schemeClr val="bg1"/>
+            </a:solidFill>
+            <a:prstDash val="solid"/>
+            <a:headEnd type="none" w="med" len="med"/>
+            <a:tailEnd type="none" w="med" len="med"/>
+          </a:ln>
+          <a:effectLst/>
+        </p:spPr>
+        <p:style>
+          <a:lnRef idx="1">
+            <a:schemeClr val="accent5"/>
+          </a:lnRef>
+          <a:fillRef idx="3">
+            <a:schemeClr val="accent5"/>
+          </a:fillRef>
+          <a:effectRef idx="2">
+            <a:schemeClr val="accent5"/>
+          </a:effectRef>
+          <a:fontRef idx="minor">
+            <a:schemeClr val="lt1"/>
+          </a:fontRef>
+        </p:style>
+        <p:txBody>
+          <a:bodyPr vert="horz" wrap="square" lIns="0" tIns="0" rIns="0" bIns="0" numCol="1" rtlCol="0" anchor="ctr" anchorCtr="0" compatLnSpc="1">
+            <a:prstTxWarp prst="textNoShape">
+              <a:avLst/>
+            </a:prstTxWarp>
+            <a:noAutofit/>
+          </a:bodyPr>
+          <a:lstStyle/>
+          <a:p>
+            <a:pPr algn="ctr" defTabSz="685784" fontAlgn="base">
+              <a:lnSpc>
+                <a:spcPct val="90000"/>
+              </a:lnSpc>
+              <a:spcBef>
+                <a:spcPct val="0"/>
+              </a:spcBef>
+              <a:spcAft>
+                <a:spcPct val="0"/>
+              </a:spcAft>
+            </a:pPr>
+            <a:r>
+              <a:rPr lang="en-US" sz="675">
+                <a:solidFill>
+                  <a:schemeClr val="bg1"/>
+                </a:solidFill>
+              </a:rPr>
+              <a:t>4</a:t>
+            </a:r>
+            <a:endParaRPr lang="en-US" sz="375">
+              <a:solidFill>
+                <a:schemeClr val="bg1"/>
+              </a:solidFill>
+            </a:endParaRPr>
+          </a:p>
+        </p:txBody>
+      </p:sp>
+      <p:sp>
+        <p:nvSpPr>
+          <p:cNvPr id="13" name="Rounded Rectangle 12">
+            <a:extLst>
+              <a:ext uri="{FF2B5EF4-FFF2-40B4-BE49-F238E27FC236}">
+                <a16:creationId xmlns:a16="http://schemas.microsoft.com/office/drawing/2014/main" id="{00BCA8E7-112B-094B-8994-52A4B5E872FB}"/>
+              </a:ext>
+            </a:extLst>
+          </p:cNvPr>
+          <p:cNvSpPr/>
+          <p:nvPr/>
+        </p:nvSpPr>
+        <p:spPr bwMode="auto">
+          <a:xfrm>
+            <a:off x="6227995" y="1634579"/>
+            <a:ext cx="138128" cy="411476"/>
+          </a:xfrm>
+          <a:prstGeom prst="roundRect">
+            <a:avLst/>
+          </a:prstGeom>
+          <a:solidFill>
+            <a:schemeClr val="bg1">
+              <a:lumMod val="50000"/>
+            </a:schemeClr>
+          </a:solidFill>
+          <a:ln>
+            <a:solidFill>
+              <a:schemeClr val="bg1"/>
+            </a:solidFill>
+            <a:prstDash val="solid"/>
+            <a:headEnd type="none" w="med" len="med"/>
+            <a:tailEnd type="none" w="med" len="med"/>
+          </a:ln>
+          <a:effectLst/>
+        </p:spPr>
+        <p:style>
+          <a:lnRef idx="1">
+            <a:schemeClr val="accent5"/>
+          </a:lnRef>
+          <a:fillRef idx="3">
+            <a:schemeClr val="accent5"/>
+          </a:fillRef>
+          <a:effectRef idx="2">
+            <a:schemeClr val="accent5"/>
+          </a:effectRef>
+          <a:fontRef idx="minor">
+            <a:schemeClr val="lt1"/>
+          </a:fontRef>
+        </p:style>
+        <p:txBody>
+          <a:bodyPr vert="horz" wrap="square" lIns="0" tIns="0" rIns="0" bIns="0" numCol="1" rtlCol="0" anchor="ctr" anchorCtr="0" compatLnSpc="1">
+            <a:prstTxWarp prst="textNoShape">
+              <a:avLst/>
+            </a:prstTxWarp>
+            <a:noAutofit/>
+          </a:bodyPr>
+          <a:lstStyle/>
+          <a:p>
+            <a:pPr algn="ctr" defTabSz="685784" fontAlgn="base">
+              <a:lnSpc>
+                <a:spcPct val="90000"/>
+              </a:lnSpc>
+              <a:spcBef>
+                <a:spcPct val="0"/>
+              </a:spcBef>
+              <a:spcAft>
+                <a:spcPct val="0"/>
+              </a:spcAft>
+            </a:pPr>
+            <a:r>
+              <a:rPr lang="en-US" sz="675">
+                <a:solidFill>
+                  <a:schemeClr val="bg1"/>
+                </a:solidFill>
+              </a:rPr>
+              <a:t>5</a:t>
+            </a:r>
+            <a:endParaRPr lang="en-US" sz="375">
+              <a:solidFill>
+                <a:schemeClr val="bg1"/>
+              </a:solidFill>
+            </a:endParaRPr>
+          </a:p>
+        </p:txBody>
+      </p:sp>
+      <p:sp>
+        <p:nvSpPr>
+          <p:cNvPr id="14" name="AutoShape 4">
+            <a:extLst>
+              <a:ext uri="{FF2B5EF4-FFF2-40B4-BE49-F238E27FC236}">
+                <a16:creationId xmlns:a16="http://schemas.microsoft.com/office/drawing/2014/main" id="{419F5FD2-9DE2-F445-A68B-0CAD344E39B6}"/>
+              </a:ext>
+            </a:extLst>
+          </p:cNvPr>
+          <p:cNvSpPr>
+            <a:spLocks noChangeArrowheads="1"/>
+          </p:cNvSpPr>
+          <p:nvPr/>
+        </p:nvSpPr>
+        <p:spPr bwMode="auto">
+          <a:xfrm>
+            <a:off x="4935506" y="1499732"/>
+            <a:ext cx="3333325" cy="745927"/>
+          </a:xfrm>
+          <a:prstGeom prst="roundRect">
+            <a:avLst>
+              <a:gd name="adj" fmla="val 7117"/>
+            </a:avLst>
+          </a:prstGeom>
+          <a:noFill/>
+          <a:ln w="12700">
+            <a:solidFill>
+              <a:schemeClr val="accent3"/>
+            </a:solidFill>
+            <a:prstDash val="dash"/>
+            <a:round/>
+            <a:headEnd/>
+            <a:tailEnd/>
+          </a:ln>
+        </p:spPr>
+        <p:txBody>
+          <a:bodyPr lIns="0" tIns="0" rIns="0" bIns="0" anchor="b" anchorCtr="1"/>
+          <a:lstStyle/>
+          <a:p>
+            <a:pPr algn="ctr"/>
+            <a:r>
+              <a:rPr lang="en-US" sz="750" dirty="0"/>
+              <a:t>Event Streams Cluster</a:t>
+            </a:r>
+          </a:p>
+        </p:txBody>
+      </p:sp>
+      <p:sp>
+        <p:nvSpPr>
+          <p:cNvPr id="18" name="AutoShape 4">
+            <a:extLst>
+              <a:ext uri="{FF2B5EF4-FFF2-40B4-BE49-F238E27FC236}">
+                <a16:creationId xmlns:a16="http://schemas.microsoft.com/office/drawing/2014/main" id="{211CB3E3-B829-2C4F-A3D6-B13BE7F48F22}"/>
+              </a:ext>
+            </a:extLst>
+          </p:cNvPr>
+          <p:cNvSpPr>
+            <a:spLocks noChangeArrowheads="1"/>
+          </p:cNvSpPr>
+          <p:nvPr/>
+        </p:nvSpPr>
+        <p:spPr bwMode="auto">
+          <a:xfrm>
+            <a:off x="411972" y="1363612"/>
+            <a:ext cx="3611870" cy="2482247"/>
+          </a:xfrm>
+          <a:prstGeom prst="roundRect">
+            <a:avLst>
+              <a:gd name="adj" fmla="val 3325"/>
+            </a:avLst>
+          </a:prstGeom>
+          <a:noFill/>
+          <a:ln w="12700">
+            <a:solidFill>
+              <a:schemeClr val="accent3"/>
+            </a:solidFill>
+            <a:prstDash val="dash"/>
+            <a:round/>
+            <a:headEnd/>
+            <a:tailEnd/>
+          </a:ln>
+        </p:spPr>
+        <p:txBody>
+          <a:bodyPr lIns="0" tIns="0" rIns="0" bIns="0" anchor="b" anchorCtr="1"/>
+          <a:lstStyle/>
+          <a:p>
+            <a:pPr algn="ctr"/>
+            <a:endParaRPr lang="en-US" sz="750"/>
+          </a:p>
+        </p:txBody>
+      </p:sp>
+      <p:sp>
+        <p:nvSpPr>
+          <p:cNvPr id="28" name="Rounded Rectangle 27">
+            <a:extLst>
+              <a:ext uri="{FF2B5EF4-FFF2-40B4-BE49-F238E27FC236}">
+                <a16:creationId xmlns:a16="http://schemas.microsoft.com/office/drawing/2014/main" id="{058E4018-54EF-C241-A10F-9BB485461EFF}"/>
+              </a:ext>
+            </a:extLst>
+          </p:cNvPr>
+          <p:cNvSpPr/>
+          <p:nvPr/>
+        </p:nvSpPr>
+        <p:spPr bwMode="auto">
+          <a:xfrm>
+            <a:off x="1193647" y="1635094"/>
+            <a:ext cx="138128" cy="411476"/>
+          </a:xfrm>
+          <a:prstGeom prst="roundRect">
+            <a:avLst/>
+          </a:prstGeom>
+          <a:solidFill>
+            <a:schemeClr val="bg1">
+              <a:lumMod val="50000"/>
+            </a:schemeClr>
+          </a:solidFill>
+          <a:ln>
+            <a:solidFill>
+              <a:schemeClr val="bg1"/>
+            </a:solidFill>
+            <a:prstDash val="solid"/>
+            <a:headEnd type="none" w="med" len="med"/>
+            <a:tailEnd type="none" w="med" len="med"/>
+          </a:ln>
+          <a:effectLst/>
+        </p:spPr>
+        <p:style>
+          <a:lnRef idx="1">
+            <a:schemeClr val="accent5"/>
+          </a:lnRef>
+          <a:fillRef idx="3">
+            <a:schemeClr val="accent5"/>
+          </a:fillRef>
+          <a:effectRef idx="2">
+            <a:schemeClr val="accent5"/>
+          </a:effectRef>
+          <a:fontRef idx="minor">
+            <a:schemeClr val="lt1"/>
+          </a:fontRef>
+        </p:style>
+        <p:txBody>
+          <a:bodyPr vert="horz" wrap="square" lIns="0" tIns="0" rIns="0" bIns="0" numCol="1" rtlCol="0" anchor="ctr" anchorCtr="0" compatLnSpc="1">
+            <a:prstTxWarp prst="textNoShape">
+              <a:avLst/>
+            </a:prstTxWarp>
+            <a:noAutofit/>
+          </a:bodyPr>
+          <a:lstStyle/>
+          <a:p>
+            <a:pPr algn="ctr" defTabSz="685784" fontAlgn="base">
+              <a:lnSpc>
+                <a:spcPct val="90000"/>
+              </a:lnSpc>
+              <a:spcBef>
+                <a:spcPct val="0"/>
+              </a:spcBef>
+              <a:spcAft>
+                <a:spcPct val="0"/>
+              </a:spcAft>
+            </a:pPr>
+            <a:r>
+              <a:rPr lang="en-US" sz="675">
+                <a:solidFill>
+                  <a:schemeClr val="bg1"/>
+                </a:solidFill>
+              </a:rPr>
+              <a:t>0</a:t>
+            </a:r>
+            <a:endParaRPr lang="en-US" sz="375">
+              <a:solidFill>
+                <a:schemeClr val="bg1"/>
+              </a:solidFill>
+            </a:endParaRPr>
+          </a:p>
+        </p:txBody>
+      </p:sp>
+      <p:sp>
+        <p:nvSpPr>
+          <p:cNvPr id="29" name="Rounded Rectangle 28">
+            <a:extLst>
+              <a:ext uri="{FF2B5EF4-FFF2-40B4-BE49-F238E27FC236}">
+                <a16:creationId xmlns:a16="http://schemas.microsoft.com/office/drawing/2014/main" id="{2DEDB43F-6BDF-F347-95A5-F47AA2B1C71F}"/>
+              </a:ext>
+            </a:extLst>
+          </p:cNvPr>
+          <p:cNvSpPr/>
+          <p:nvPr/>
+        </p:nvSpPr>
+        <p:spPr bwMode="auto">
+          <a:xfrm>
+            <a:off x="1330805" y="1635094"/>
+            <a:ext cx="138128" cy="411476"/>
+          </a:xfrm>
+          <a:prstGeom prst="roundRect">
+            <a:avLst/>
+          </a:prstGeom>
+          <a:solidFill>
+            <a:schemeClr val="bg1">
+              <a:lumMod val="50000"/>
+            </a:schemeClr>
+          </a:solidFill>
+          <a:ln>
+            <a:solidFill>
+              <a:schemeClr val="bg1"/>
+            </a:solidFill>
+            <a:prstDash val="solid"/>
+            <a:headEnd type="none" w="med" len="med"/>
+            <a:tailEnd type="none" w="med" len="med"/>
+          </a:ln>
+          <a:effectLst/>
+        </p:spPr>
+        <p:style>
+          <a:lnRef idx="1">
+            <a:schemeClr val="accent5"/>
+          </a:lnRef>
+          <a:fillRef idx="3">
+            <a:schemeClr val="accent5"/>
+          </a:fillRef>
+          <a:effectRef idx="2">
+            <a:schemeClr val="accent5"/>
+          </a:effectRef>
+          <a:fontRef idx="minor">
+            <a:schemeClr val="lt1"/>
+          </a:fontRef>
+        </p:style>
+        <p:txBody>
+          <a:bodyPr vert="horz" wrap="square" lIns="0" tIns="0" rIns="0" bIns="0" numCol="1" rtlCol="0" anchor="ctr" anchorCtr="0" compatLnSpc="1">
+            <a:prstTxWarp prst="textNoShape">
+              <a:avLst/>
+            </a:prstTxWarp>
+            <a:noAutofit/>
+          </a:bodyPr>
+          <a:lstStyle/>
+          <a:p>
+            <a:pPr algn="ctr" defTabSz="685784" fontAlgn="base">
+              <a:lnSpc>
+                <a:spcPct val="90000"/>
+              </a:lnSpc>
+              <a:spcBef>
+                <a:spcPct val="0"/>
+              </a:spcBef>
+              <a:spcAft>
+                <a:spcPct val="0"/>
+              </a:spcAft>
+            </a:pPr>
+            <a:r>
+              <a:rPr lang="en-US" sz="675">
+                <a:solidFill>
+                  <a:schemeClr val="bg1"/>
+                </a:solidFill>
+              </a:rPr>
+              <a:t>1</a:t>
+            </a:r>
+            <a:endParaRPr lang="en-US" sz="375">
+              <a:solidFill>
+                <a:schemeClr val="bg1"/>
+              </a:solidFill>
+            </a:endParaRPr>
+          </a:p>
+        </p:txBody>
+      </p:sp>
+      <p:sp>
+        <p:nvSpPr>
+          <p:cNvPr id="30" name="Rounded Rectangle 29">
+            <a:extLst>
+              <a:ext uri="{FF2B5EF4-FFF2-40B4-BE49-F238E27FC236}">
+                <a16:creationId xmlns:a16="http://schemas.microsoft.com/office/drawing/2014/main" id="{99244A3B-B483-4E43-A1E9-229B6A27DB31}"/>
+              </a:ext>
+            </a:extLst>
+          </p:cNvPr>
+          <p:cNvSpPr/>
+          <p:nvPr/>
+        </p:nvSpPr>
+        <p:spPr bwMode="auto">
+          <a:xfrm>
+            <a:off x="1468934" y="1635094"/>
+            <a:ext cx="138128" cy="411476"/>
+          </a:xfrm>
+          <a:prstGeom prst="roundRect">
+            <a:avLst/>
+          </a:prstGeom>
+          <a:solidFill>
+            <a:schemeClr val="bg1">
+              <a:lumMod val="50000"/>
+            </a:schemeClr>
+          </a:solidFill>
+          <a:ln>
+            <a:solidFill>
+              <a:schemeClr val="bg1"/>
+            </a:solidFill>
+            <a:prstDash val="solid"/>
+            <a:headEnd type="none" w="med" len="med"/>
+            <a:tailEnd type="none" w="med" len="med"/>
+          </a:ln>
+          <a:effectLst/>
+        </p:spPr>
+        <p:style>
+          <a:lnRef idx="1">
+            <a:schemeClr val="accent5"/>
+          </a:lnRef>
+          <a:fillRef idx="3">
+            <a:schemeClr val="accent5"/>
+          </a:fillRef>
+          <a:effectRef idx="2">
+            <a:schemeClr val="accent5"/>
+          </a:effectRef>
+          <a:fontRef idx="minor">
+            <a:schemeClr val="lt1"/>
+          </a:fontRef>
+        </p:style>
+        <p:txBody>
+          <a:bodyPr vert="horz" wrap="square" lIns="0" tIns="0" rIns="0" bIns="0" numCol="1" rtlCol="0" anchor="ctr" anchorCtr="0" compatLnSpc="1">
+            <a:prstTxWarp prst="textNoShape">
+              <a:avLst/>
+            </a:prstTxWarp>
+            <a:noAutofit/>
+          </a:bodyPr>
+          <a:lstStyle/>
+          <a:p>
+            <a:pPr algn="ctr" defTabSz="685784" fontAlgn="base">
+              <a:lnSpc>
+                <a:spcPct val="90000"/>
+              </a:lnSpc>
+              <a:spcBef>
+                <a:spcPct val="0"/>
+              </a:spcBef>
+              <a:spcAft>
+                <a:spcPct val="0"/>
+              </a:spcAft>
+            </a:pPr>
+            <a:r>
+              <a:rPr lang="en-US" sz="675">
+                <a:solidFill>
+                  <a:schemeClr val="bg1"/>
+                </a:solidFill>
+              </a:rPr>
+              <a:t>2</a:t>
+            </a:r>
+            <a:endParaRPr lang="en-US" sz="375">
+              <a:solidFill>
+                <a:schemeClr val="bg1"/>
+              </a:solidFill>
+            </a:endParaRPr>
+          </a:p>
+        </p:txBody>
+      </p:sp>
+      <p:sp>
+        <p:nvSpPr>
+          <p:cNvPr id="31" name="Rounded Rectangle 30">
+            <a:extLst>
+              <a:ext uri="{FF2B5EF4-FFF2-40B4-BE49-F238E27FC236}">
+                <a16:creationId xmlns:a16="http://schemas.microsoft.com/office/drawing/2014/main" id="{2FC00369-550F-1D47-959E-8E43C24D3F4F}"/>
+              </a:ext>
+            </a:extLst>
+          </p:cNvPr>
+          <p:cNvSpPr/>
+          <p:nvPr/>
+        </p:nvSpPr>
+        <p:spPr bwMode="auto">
+          <a:xfrm>
+            <a:off x="1606093" y="1635094"/>
+            <a:ext cx="138128" cy="411476"/>
+          </a:xfrm>
+          <a:prstGeom prst="roundRect">
+            <a:avLst/>
+          </a:prstGeom>
+          <a:solidFill>
+            <a:schemeClr val="bg1">
+              <a:lumMod val="50000"/>
+            </a:schemeClr>
+          </a:solidFill>
+          <a:ln>
+            <a:solidFill>
+              <a:schemeClr val="bg1"/>
+            </a:solidFill>
+            <a:prstDash val="solid"/>
+            <a:headEnd type="none" w="med" len="med"/>
+            <a:tailEnd type="none" w="med" len="med"/>
+          </a:ln>
+          <a:effectLst/>
+        </p:spPr>
+        <p:style>
+          <a:lnRef idx="1">
+            <a:schemeClr val="accent5"/>
+          </a:lnRef>
+          <a:fillRef idx="3">
+            <a:schemeClr val="accent5"/>
+          </a:fillRef>
+          <a:effectRef idx="2">
+            <a:schemeClr val="accent5"/>
+          </a:effectRef>
+          <a:fontRef idx="minor">
+            <a:schemeClr val="lt1"/>
+          </a:fontRef>
+        </p:style>
+        <p:txBody>
+          <a:bodyPr vert="horz" wrap="square" lIns="0" tIns="0" rIns="0" bIns="0" numCol="1" rtlCol="0" anchor="ctr" anchorCtr="0" compatLnSpc="1">
+            <a:prstTxWarp prst="textNoShape">
+              <a:avLst/>
+            </a:prstTxWarp>
+            <a:noAutofit/>
+          </a:bodyPr>
+          <a:lstStyle/>
+          <a:p>
+            <a:pPr algn="ctr" defTabSz="685784" fontAlgn="base">
+              <a:lnSpc>
+                <a:spcPct val="90000"/>
+              </a:lnSpc>
+              <a:spcBef>
+                <a:spcPct val="0"/>
+              </a:spcBef>
+              <a:spcAft>
+                <a:spcPct val="0"/>
+              </a:spcAft>
+            </a:pPr>
+            <a:r>
+              <a:rPr lang="en-US" sz="675">
+                <a:solidFill>
+                  <a:schemeClr val="bg1"/>
+                </a:solidFill>
+              </a:rPr>
+              <a:t>3</a:t>
+            </a:r>
+            <a:endParaRPr lang="en-US" sz="375">
+              <a:solidFill>
+                <a:schemeClr val="bg1"/>
+              </a:solidFill>
+            </a:endParaRPr>
+          </a:p>
+        </p:txBody>
+      </p:sp>
+      <p:sp>
+        <p:nvSpPr>
+          <p:cNvPr id="32" name="Rounded Rectangle 31">
+            <a:extLst>
+              <a:ext uri="{FF2B5EF4-FFF2-40B4-BE49-F238E27FC236}">
+                <a16:creationId xmlns:a16="http://schemas.microsoft.com/office/drawing/2014/main" id="{CEA02F82-9665-7243-AA5C-E8A8BC93F3C2}"/>
+              </a:ext>
+            </a:extLst>
+          </p:cNvPr>
+          <p:cNvSpPr/>
+          <p:nvPr/>
+        </p:nvSpPr>
+        <p:spPr bwMode="auto">
+          <a:xfrm>
+            <a:off x="1744220" y="1635094"/>
+            <a:ext cx="138128" cy="411476"/>
+          </a:xfrm>
+          <a:prstGeom prst="roundRect">
+            <a:avLst/>
+          </a:prstGeom>
+          <a:solidFill>
+            <a:schemeClr val="bg1">
+              <a:lumMod val="50000"/>
+            </a:schemeClr>
+          </a:solidFill>
+          <a:ln>
+            <a:solidFill>
+              <a:schemeClr val="bg1"/>
+            </a:solidFill>
+            <a:prstDash val="solid"/>
+            <a:headEnd type="none" w="med" len="med"/>
+            <a:tailEnd type="none" w="med" len="med"/>
+          </a:ln>
+          <a:effectLst/>
+        </p:spPr>
+        <p:style>
+          <a:lnRef idx="1">
+            <a:schemeClr val="accent5"/>
+          </a:lnRef>
+          <a:fillRef idx="3">
+            <a:schemeClr val="accent5"/>
+          </a:fillRef>
+          <a:effectRef idx="2">
+            <a:schemeClr val="accent5"/>
+          </a:effectRef>
+          <a:fontRef idx="minor">
+            <a:schemeClr val="lt1"/>
+          </a:fontRef>
+        </p:style>
+        <p:txBody>
+          <a:bodyPr vert="horz" wrap="square" lIns="0" tIns="0" rIns="0" bIns="0" numCol="1" rtlCol="0" anchor="ctr" anchorCtr="0" compatLnSpc="1">
+            <a:prstTxWarp prst="textNoShape">
+              <a:avLst/>
+            </a:prstTxWarp>
+            <a:noAutofit/>
+          </a:bodyPr>
+          <a:lstStyle/>
+          <a:p>
+            <a:pPr algn="ctr" defTabSz="685784" fontAlgn="base">
+              <a:lnSpc>
+                <a:spcPct val="90000"/>
+              </a:lnSpc>
+              <a:spcBef>
+                <a:spcPct val="0"/>
+              </a:spcBef>
+              <a:spcAft>
+                <a:spcPct val="0"/>
+              </a:spcAft>
+            </a:pPr>
+            <a:r>
+              <a:rPr lang="en-US" sz="675">
+                <a:solidFill>
+                  <a:schemeClr val="bg1"/>
+                </a:solidFill>
+              </a:rPr>
+              <a:t>4</a:t>
+            </a:r>
+            <a:endParaRPr lang="en-US" sz="375">
+              <a:solidFill>
+                <a:schemeClr val="bg1"/>
+              </a:solidFill>
+            </a:endParaRPr>
+          </a:p>
+        </p:txBody>
+      </p:sp>
+      <p:sp>
+        <p:nvSpPr>
+          <p:cNvPr id="33" name="Rounded Rectangle 32">
+            <a:extLst>
+              <a:ext uri="{FF2B5EF4-FFF2-40B4-BE49-F238E27FC236}">
+                <a16:creationId xmlns:a16="http://schemas.microsoft.com/office/drawing/2014/main" id="{23355CB8-33EA-2344-9D2F-FD6C81E06FC2}"/>
+              </a:ext>
+            </a:extLst>
+          </p:cNvPr>
+          <p:cNvSpPr/>
+          <p:nvPr/>
+        </p:nvSpPr>
+        <p:spPr bwMode="auto">
+          <a:xfrm>
+            <a:off x="1874043" y="1635094"/>
+            <a:ext cx="138128" cy="411476"/>
+          </a:xfrm>
+          <a:prstGeom prst="roundRect">
+            <a:avLst/>
+          </a:prstGeom>
+          <a:solidFill>
+            <a:schemeClr val="bg1">
+              <a:lumMod val="50000"/>
+            </a:schemeClr>
+          </a:solidFill>
+          <a:ln>
+            <a:solidFill>
+              <a:schemeClr val="bg1"/>
+            </a:solidFill>
+            <a:prstDash val="solid"/>
+            <a:headEnd type="none" w="med" len="med"/>
+            <a:tailEnd type="none" w="med" len="med"/>
+          </a:ln>
+          <a:effectLst/>
+        </p:spPr>
+        <p:style>
+          <a:lnRef idx="1">
+            <a:schemeClr val="accent5"/>
+          </a:lnRef>
+          <a:fillRef idx="3">
+            <a:schemeClr val="accent5"/>
+          </a:fillRef>
+          <a:effectRef idx="2">
+            <a:schemeClr val="accent5"/>
+          </a:effectRef>
+          <a:fontRef idx="minor">
+            <a:schemeClr val="lt1"/>
+          </a:fontRef>
+        </p:style>
+        <p:txBody>
+          <a:bodyPr vert="horz" wrap="square" lIns="0" tIns="0" rIns="0" bIns="0" numCol="1" rtlCol="0" anchor="ctr" anchorCtr="0" compatLnSpc="1">
+            <a:prstTxWarp prst="textNoShape">
+              <a:avLst/>
+            </a:prstTxWarp>
+            <a:noAutofit/>
+          </a:bodyPr>
+          <a:lstStyle/>
+          <a:p>
+            <a:pPr algn="ctr" defTabSz="685784" fontAlgn="base">
+              <a:lnSpc>
+                <a:spcPct val="90000"/>
+              </a:lnSpc>
+              <a:spcBef>
+                <a:spcPct val="0"/>
+              </a:spcBef>
+              <a:spcAft>
+                <a:spcPct val="0"/>
+              </a:spcAft>
+            </a:pPr>
+            <a:r>
+              <a:rPr lang="en-US" sz="675">
+                <a:solidFill>
+                  <a:schemeClr val="bg1"/>
+                </a:solidFill>
+              </a:rPr>
+              <a:t>5</a:t>
+            </a:r>
+            <a:endParaRPr lang="en-US" sz="375">
+              <a:solidFill>
+                <a:schemeClr val="bg1"/>
+              </a:solidFill>
+            </a:endParaRPr>
+          </a:p>
+        </p:txBody>
+      </p:sp>
+      <p:sp>
+        <p:nvSpPr>
+          <p:cNvPr id="34" name="AutoShape 4">
+            <a:extLst>
+              <a:ext uri="{FF2B5EF4-FFF2-40B4-BE49-F238E27FC236}">
+                <a16:creationId xmlns:a16="http://schemas.microsoft.com/office/drawing/2014/main" id="{B1D40963-EC1B-E049-A09B-96D331A21F58}"/>
+              </a:ext>
+            </a:extLst>
+          </p:cNvPr>
+          <p:cNvSpPr>
+            <a:spLocks noChangeArrowheads="1"/>
+          </p:cNvSpPr>
+          <p:nvPr/>
+        </p:nvSpPr>
+        <p:spPr bwMode="auto">
+          <a:xfrm>
+            <a:off x="598146" y="1516741"/>
+            <a:ext cx="3207204" cy="745412"/>
+          </a:xfrm>
+          <a:prstGeom prst="roundRect">
+            <a:avLst>
+              <a:gd name="adj" fmla="val 7117"/>
+            </a:avLst>
+          </a:prstGeom>
+          <a:noFill/>
+          <a:ln w="12700">
+            <a:solidFill>
+              <a:schemeClr val="accent3"/>
+            </a:solidFill>
+            <a:prstDash val="dash"/>
+            <a:round/>
+            <a:headEnd/>
+            <a:tailEnd/>
+          </a:ln>
+        </p:spPr>
+        <p:txBody>
+          <a:bodyPr lIns="0" tIns="0" rIns="0" bIns="0" anchor="b" anchorCtr="1"/>
+          <a:lstStyle/>
+          <a:p>
+            <a:pPr algn="ctr"/>
+            <a:r>
+              <a:rPr lang="en-US" sz="750" dirty="0"/>
+              <a:t>Kafka Cluster</a:t>
+            </a:r>
+          </a:p>
+        </p:txBody>
+      </p:sp>
+      <p:sp>
+        <p:nvSpPr>
+          <p:cNvPr id="45" name="Rounded Rectangle 44">
+            <a:extLst>
+              <a:ext uri="{FF2B5EF4-FFF2-40B4-BE49-F238E27FC236}">
+                <a16:creationId xmlns:a16="http://schemas.microsoft.com/office/drawing/2014/main" id="{034D0250-3CFC-6843-9DDB-30E02E9EBC18}"/>
+              </a:ext>
+            </a:extLst>
+          </p:cNvPr>
+          <p:cNvSpPr/>
+          <p:nvPr/>
+        </p:nvSpPr>
+        <p:spPr>
+          <a:xfrm>
+            <a:off x="639544" y="2819064"/>
+            <a:ext cx="994405" cy="430365"/>
+          </a:xfrm>
+          <a:prstGeom prst="roundRect">
+            <a:avLst/>
+          </a:prstGeom>
+          <a:solidFill>
+            <a:srgbClr val="D8A602"/>
+          </a:solidFill>
+          <a:ln>
+            <a:noFill/>
+          </a:ln>
+          <a:effectLst>
+            <a:outerShdw blurRad="50800" dist="38100" dir="5400000" algn="t" rotWithShape="0">
+              <a:prstClr val="black">
+                <a:alpha val="40000"/>
+              </a:prstClr>
+            </a:outerShdw>
+          </a:effectLst>
+        </p:spPr>
+        <p:style>
+          <a:lnRef idx="2">
+            <a:schemeClr val="accent1">
+              <a:shade val="50000"/>
+            </a:schemeClr>
+          </a:lnRef>
+          <a:fillRef idx="1">
+            <a:schemeClr val="accent1"/>
+          </a:fillRef>
+          <a:effectRef idx="0">
+            <a:schemeClr val="accent1"/>
+          </a:effectRef>
+          <a:fontRef idx="minor">
+            <a:schemeClr val="lt1"/>
+          </a:fontRef>
+        </p:style>
+        <p:txBody>
+          <a:bodyPr rtlCol="0" anchor="t"/>
+          <a:lstStyle/>
+          <a:p>
+            <a:pPr algn="ctr" defTabSz="514350"/>
+            <a:r>
+              <a:rPr lang="en-US" sz="750" dirty="0">
+                <a:solidFill>
+                  <a:prstClr val="white"/>
+                </a:solidFill>
+                <a:latin typeface="Arial"/>
+              </a:rPr>
+              <a:t>Consumer</a:t>
+            </a:r>
+          </a:p>
+        </p:txBody>
+      </p:sp>
+      <p:sp>
+        <p:nvSpPr>
+          <p:cNvPr id="46" name="AutoShape 4">
+            <a:extLst>
+              <a:ext uri="{FF2B5EF4-FFF2-40B4-BE49-F238E27FC236}">
+                <a16:creationId xmlns:a16="http://schemas.microsoft.com/office/drawing/2014/main" id="{490EA60F-E5B8-2A4C-8350-F638E3310E3C}"/>
+              </a:ext>
+            </a:extLst>
+          </p:cNvPr>
+          <p:cNvSpPr>
+            <a:spLocks noChangeArrowheads="1"/>
+          </p:cNvSpPr>
+          <p:nvPr/>
+        </p:nvSpPr>
+        <p:spPr bwMode="auto">
+          <a:xfrm>
+            <a:off x="2008858" y="2530237"/>
+            <a:ext cx="1812650" cy="745412"/>
+          </a:xfrm>
+          <a:prstGeom prst="roundRect">
+            <a:avLst>
+              <a:gd name="adj" fmla="val 7117"/>
+            </a:avLst>
+          </a:prstGeom>
+          <a:noFill/>
+          <a:ln w="12700">
+            <a:solidFill>
+              <a:schemeClr val="accent3"/>
+            </a:solidFill>
+            <a:prstDash val="dash"/>
+            <a:round/>
+            <a:headEnd/>
+            <a:tailEnd/>
+          </a:ln>
+        </p:spPr>
+        <p:txBody>
+          <a:bodyPr lIns="0" tIns="0" rIns="0" bIns="0" anchor="b" anchorCtr="1"/>
+          <a:lstStyle/>
+          <a:p>
+            <a:pPr algn="ctr"/>
+            <a:r>
+              <a:rPr lang="en-US" sz="750" dirty="0"/>
+              <a:t>Kafka Connect Cluster</a:t>
+            </a:r>
+          </a:p>
+        </p:txBody>
+      </p:sp>
+      <p:sp>
+        <p:nvSpPr>
+          <p:cNvPr id="52" name="Cloud 51">
+            <a:extLst>
+              <a:ext uri="{FF2B5EF4-FFF2-40B4-BE49-F238E27FC236}">
+                <a16:creationId xmlns:a16="http://schemas.microsoft.com/office/drawing/2014/main" id="{4695F1F6-1E1D-364B-B95A-5F6E3043E184}"/>
+              </a:ext>
+            </a:extLst>
+          </p:cNvPr>
+          <p:cNvSpPr/>
+          <p:nvPr/>
+        </p:nvSpPr>
+        <p:spPr>
+          <a:xfrm rot="16200000">
+            <a:off x="3800806" y="2418013"/>
+            <a:ext cx="1442045" cy="393701"/>
+          </a:xfrm>
+          <a:prstGeom prst="cloud">
+            <a:avLst/>
+          </a:prstGeom>
+          <a:noFill/>
+          <a:ln>
+            <a:solidFill>
+              <a:schemeClr val="tx2">
+                <a:lumMod val="60000"/>
+                <a:lumOff val="40000"/>
+              </a:schemeClr>
+            </a:solidFill>
+          </a:ln>
+        </p:spPr>
+        <p:style>
+          <a:lnRef idx="2">
+            <a:schemeClr val="accent1">
+              <a:shade val="50000"/>
+            </a:schemeClr>
+          </a:lnRef>
+          <a:fillRef idx="1">
+            <a:schemeClr val="accent1"/>
+          </a:fillRef>
+          <a:effectRef idx="0">
+            <a:schemeClr val="accent1"/>
+          </a:effectRef>
+          <a:fontRef idx="minor">
+            <a:schemeClr val="lt1"/>
+          </a:fontRef>
+        </p:style>
+        <p:txBody>
+          <a:bodyPr rtlCol="0" anchor="ctr"/>
+          <a:lstStyle/>
+          <a:p>
+            <a:pPr algn="ctr"/>
+            <a:endParaRPr lang="en-US" sz="1013"/>
+          </a:p>
+        </p:txBody>
+      </p:sp>
+      <p:pic>
+        <p:nvPicPr>
+          <p:cNvPr id="37" name="Picture 36">
+            <a:extLst>
+              <a:ext uri="{FF2B5EF4-FFF2-40B4-BE49-F238E27FC236}">
+                <a16:creationId xmlns:a16="http://schemas.microsoft.com/office/drawing/2014/main" id="{6D8F6862-7739-D946-A521-B5976D86EED8}"/>
+              </a:ext>
+            </a:extLst>
+          </p:cNvPr>
+          <p:cNvPicPr>
+            <a:picLocks noChangeAspect="1"/>
+          </p:cNvPicPr>
+          <p:nvPr/>
+        </p:nvPicPr>
+        <p:blipFill>
+          <a:blip r:embed="rId2"/>
+          <a:stretch>
+            <a:fillRect/>
+          </a:stretch>
+        </p:blipFill>
+        <p:spPr>
+          <a:xfrm>
+            <a:off x="1956920" y="2941013"/>
+            <a:ext cx="376238" cy="371475"/>
+          </a:xfrm>
+          <a:prstGeom prst="rect">
+            <a:avLst/>
+          </a:prstGeom>
+        </p:spPr>
+      </p:pic>
+      <p:sp>
+        <p:nvSpPr>
+          <p:cNvPr id="38" name="Rounded Rectangle 37">
+            <a:extLst>
+              <a:ext uri="{FF2B5EF4-FFF2-40B4-BE49-F238E27FC236}">
+                <a16:creationId xmlns:a16="http://schemas.microsoft.com/office/drawing/2014/main" id="{B8888133-CCF3-0944-9B5C-B88A02187A65}"/>
+              </a:ext>
+            </a:extLst>
+          </p:cNvPr>
+          <p:cNvSpPr/>
+          <p:nvPr/>
+        </p:nvSpPr>
+        <p:spPr>
+          <a:xfrm>
+            <a:off x="2463609" y="2672578"/>
+            <a:ext cx="994405" cy="292973"/>
+          </a:xfrm>
+          <a:prstGeom prst="roundRect">
+            <a:avLst/>
+          </a:prstGeom>
+          <a:solidFill>
+            <a:srgbClr val="7030A0"/>
+          </a:solidFill>
+          <a:ln>
+            <a:noFill/>
+          </a:ln>
+          <a:effectLst>
+            <a:outerShdw blurRad="50800" dist="38100" dir="5400000" algn="t" rotWithShape="0">
+              <a:prstClr val="black">
+                <a:alpha val="40000"/>
+              </a:prstClr>
+            </a:outerShdw>
+          </a:effectLst>
+        </p:spPr>
+        <p:style>
+          <a:lnRef idx="2">
+            <a:schemeClr val="accent1">
+              <a:shade val="50000"/>
+            </a:schemeClr>
+          </a:lnRef>
+          <a:fillRef idx="1">
+            <a:schemeClr val="accent1"/>
+          </a:fillRef>
+          <a:effectRef idx="0">
+            <a:schemeClr val="accent1"/>
+          </a:effectRef>
+          <a:fontRef idx="minor">
+            <a:schemeClr val="lt1"/>
+          </a:fontRef>
+        </p:style>
+        <p:txBody>
+          <a:bodyPr rtlCol="0" anchor="t"/>
+          <a:lstStyle/>
+          <a:p>
+            <a:pPr algn="ctr" defTabSz="514350"/>
+            <a:r>
+              <a:rPr lang="en-US" sz="750">
+                <a:solidFill>
+                  <a:prstClr val="white"/>
+                </a:solidFill>
+                <a:latin typeface="Arial"/>
+              </a:rPr>
+              <a:t>Mirror Maker 2.0</a:t>
+            </a:r>
+          </a:p>
+        </p:txBody>
+      </p:sp>
+      <p:sp>
+        <p:nvSpPr>
+          <p:cNvPr id="7" name="TextBox 6">
+            <a:extLst>
+              <a:ext uri="{FF2B5EF4-FFF2-40B4-BE49-F238E27FC236}">
+                <a16:creationId xmlns:a16="http://schemas.microsoft.com/office/drawing/2014/main" id="{9C49EA51-B835-094C-91A0-D088AFF81C4B}"/>
+              </a:ext>
+            </a:extLst>
+          </p:cNvPr>
+          <p:cNvSpPr txBox="1"/>
+          <p:nvPr/>
+        </p:nvSpPr>
+        <p:spPr>
+          <a:xfrm>
+            <a:off x="3263370" y="1476355"/>
+            <a:ext cx="577402" cy="276999"/>
+          </a:xfrm>
+          <a:prstGeom prst="rect">
+            <a:avLst/>
+          </a:prstGeom>
+          <a:noFill/>
+        </p:spPr>
+        <p:txBody>
+          <a:bodyPr wrap="none" rtlCol="0">
+            <a:spAutoFit/>
+          </a:bodyPr>
+          <a:lstStyle/>
+          <a:p>
+            <a:r>
+              <a:rPr lang="en-US" sz="1200" dirty="0"/>
+              <a:t>target</a:t>
+            </a:r>
+          </a:p>
+        </p:txBody>
+      </p:sp>
+      <p:sp>
+        <p:nvSpPr>
+          <p:cNvPr id="39" name="TextBox 38">
+            <a:extLst>
+              <a:ext uri="{FF2B5EF4-FFF2-40B4-BE49-F238E27FC236}">
+                <a16:creationId xmlns:a16="http://schemas.microsoft.com/office/drawing/2014/main" id="{E43F178F-4B90-3F45-964F-1FF716720D0E}"/>
+              </a:ext>
+            </a:extLst>
+          </p:cNvPr>
+          <p:cNvSpPr txBox="1"/>
+          <p:nvPr/>
+        </p:nvSpPr>
+        <p:spPr>
+          <a:xfrm>
+            <a:off x="7050077" y="2011888"/>
+            <a:ext cx="644728" cy="276999"/>
+          </a:xfrm>
+          <a:prstGeom prst="rect">
+            <a:avLst/>
+          </a:prstGeom>
+          <a:noFill/>
+        </p:spPr>
+        <p:txBody>
+          <a:bodyPr wrap="none" rtlCol="0">
+            <a:spAutoFit/>
+          </a:bodyPr>
+          <a:lstStyle/>
+          <a:p>
+            <a:r>
+              <a:rPr lang="en-US" sz="1200" dirty="0"/>
+              <a:t>source</a:t>
+            </a:r>
+          </a:p>
+        </p:txBody>
+      </p:sp>
+      <p:cxnSp>
+        <p:nvCxnSpPr>
+          <p:cNvPr id="21" name="Elbow Connector 20">
+            <a:extLst>
+              <a:ext uri="{FF2B5EF4-FFF2-40B4-BE49-F238E27FC236}">
+                <a16:creationId xmlns:a16="http://schemas.microsoft.com/office/drawing/2014/main" id="{1FA5726D-2767-B849-85A3-7CAA002588F7}"/>
+              </a:ext>
+            </a:extLst>
+          </p:cNvPr>
+          <p:cNvCxnSpPr>
+            <a:cxnSpLocks/>
+            <a:stCxn id="11" idx="0"/>
+            <a:endCxn id="38" idx="3"/>
+          </p:cNvCxnSpPr>
+          <p:nvPr/>
+        </p:nvCxnSpPr>
+        <p:spPr>
+          <a:xfrm rot="16200000" flipH="1" flipV="1">
+            <a:off x="4151319" y="941274"/>
+            <a:ext cx="1184485" cy="2571095"/>
+          </a:xfrm>
+          <a:prstGeom prst="bentConnector4">
+            <a:avLst>
+              <a:gd name="adj1" fmla="val -20323"/>
+              <a:gd name="adj2" fmla="val 58618"/>
+            </a:avLst>
+          </a:prstGeom>
+          <a:ln w="15875">
+            <a:solidFill>
+              <a:srgbClr val="7030A0"/>
+            </a:solidFill>
+            <a:tailEnd type="triangle"/>
+          </a:ln>
+          <a:effectLst/>
+        </p:spPr>
+        <p:style>
+          <a:lnRef idx="2">
+            <a:schemeClr val="accent1"/>
+          </a:lnRef>
+          <a:fillRef idx="0">
+            <a:schemeClr val="accent1"/>
+          </a:fillRef>
+          <a:effectRef idx="1">
+            <a:schemeClr val="accent1"/>
+          </a:effectRef>
+          <a:fontRef idx="minor">
+            <a:schemeClr val="tx1"/>
+          </a:fontRef>
+        </p:style>
+      </p:cxnSp>
+      <p:cxnSp>
+        <p:nvCxnSpPr>
+          <p:cNvPr id="53" name="Elbow Connector 52">
+            <a:extLst>
+              <a:ext uri="{FF2B5EF4-FFF2-40B4-BE49-F238E27FC236}">
+                <a16:creationId xmlns:a16="http://schemas.microsoft.com/office/drawing/2014/main" id="{0DC1C79B-85E9-B246-88E9-908878ECC75B}"/>
+              </a:ext>
+            </a:extLst>
+          </p:cNvPr>
+          <p:cNvCxnSpPr>
+            <a:cxnSpLocks/>
+            <a:stCxn id="38" idx="1"/>
+            <a:endCxn id="33" idx="2"/>
+          </p:cNvCxnSpPr>
+          <p:nvPr/>
+        </p:nvCxnSpPr>
+        <p:spPr>
+          <a:xfrm rot="10800000">
+            <a:off x="1943108" y="2046570"/>
+            <a:ext cx="520502" cy="772494"/>
+          </a:xfrm>
+          <a:prstGeom prst="bentConnector2">
+            <a:avLst/>
+          </a:prstGeom>
+          <a:ln w="15875">
+            <a:solidFill>
+              <a:srgbClr val="7030A0"/>
+            </a:solidFill>
+            <a:tailEnd type="triangle"/>
+          </a:ln>
+          <a:effectLst/>
+        </p:spPr>
+        <p:style>
+          <a:lnRef idx="2">
+            <a:schemeClr val="accent1"/>
+          </a:lnRef>
+          <a:fillRef idx="0">
+            <a:schemeClr val="accent1"/>
+          </a:fillRef>
+          <a:effectRef idx="1">
+            <a:schemeClr val="accent1"/>
+          </a:effectRef>
+          <a:fontRef idx="minor">
+            <a:schemeClr val="tx1"/>
+          </a:fontRef>
+        </p:style>
+      </p:cxnSp>
+      <p:sp>
+        <p:nvSpPr>
+          <p:cNvPr id="49" name="Rounded Rectangle 48">
+            <a:extLst>
+              <a:ext uri="{FF2B5EF4-FFF2-40B4-BE49-F238E27FC236}">
+                <a16:creationId xmlns:a16="http://schemas.microsoft.com/office/drawing/2014/main" id="{0B0F9AEA-B6CC-084B-A827-8EC8E3F6D6A5}"/>
+              </a:ext>
+            </a:extLst>
+          </p:cNvPr>
+          <p:cNvSpPr/>
+          <p:nvPr/>
+        </p:nvSpPr>
+        <p:spPr>
+          <a:xfrm>
+            <a:off x="6982404" y="2975166"/>
+            <a:ext cx="1218911" cy="371475"/>
+          </a:xfrm>
+          <a:prstGeom prst="roundRect">
+            <a:avLst/>
+          </a:prstGeom>
+          <a:solidFill>
+            <a:srgbClr val="D8A602"/>
+          </a:solidFill>
+          <a:ln>
+            <a:noFill/>
+          </a:ln>
+          <a:effectLst>
+            <a:outerShdw blurRad="50800" dist="38100" dir="5400000" algn="t" rotWithShape="0">
+              <a:prstClr val="black">
+                <a:alpha val="40000"/>
+              </a:prstClr>
+            </a:outerShdw>
+          </a:effectLst>
+        </p:spPr>
+        <p:style>
+          <a:lnRef idx="2">
+            <a:schemeClr val="accent1">
+              <a:shade val="50000"/>
+            </a:schemeClr>
+          </a:lnRef>
+          <a:fillRef idx="1">
+            <a:schemeClr val="accent1"/>
+          </a:fillRef>
+          <a:effectRef idx="0">
+            <a:schemeClr val="accent1"/>
+          </a:effectRef>
+          <a:fontRef idx="minor">
+            <a:schemeClr val="lt1"/>
+          </a:fontRef>
+        </p:style>
+        <p:txBody>
+          <a:bodyPr rtlCol="0" anchor="t"/>
+          <a:lstStyle/>
+          <a:p>
+            <a:pPr algn="ctr" defTabSz="514350"/>
+            <a:r>
+              <a:rPr lang="en-US" sz="750" dirty="0">
+                <a:solidFill>
+                  <a:prstClr val="white"/>
+                </a:solidFill>
+              </a:rPr>
+              <a:t>Producer</a:t>
+            </a:r>
+            <a:endParaRPr lang="en-US" sz="750" dirty="0">
+              <a:solidFill>
+                <a:prstClr val="white"/>
+              </a:solidFill>
+              <a:latin typeface="Arial"/>
+            </a:endParaRPr>
+          </a:p>
+        </p:txBody>
+      </p:sp>
+      <p:cxnSp>
+        <p:nvCxnSpPr>
+          <p:cNvPr id="22" name="Elbow Connector 21">
+            <a:extLst>
+              <a:ext uri="{FF2B5EF4-FFF2-40B4-BE49-F238E27FC236}">
+                <a16:creationId xmlns:a16="http://schemas.microsoft.com/office/drawing/2014/main" id="{44F8EE2A-5BE0-E545-925C-5D70891B4DA5}"/>
+              </a:ext>
+            </a:extLst>
+          </p:cNvPr>
+          <p:cNvCxnSpPr>
+            <a:cxnSpLocks/>
+            <a:stCxn id="32" idx="2"/>
+            <a:endCxn id="45" idx="0"/>
+          </p:cNvCxnSpPr>
+          <p:nvPr/>
+        </p:nvCxnSpPr>
+        <p:spPr>
+          <a:xfrm rot="5400000">
+            <a:off x="1088769" y="2094549"/>
+            <a:ext cx="772494" cy="676537"/>
+          </a:xfrm>
+          <a:prstGeom prst="bentConnector3">
+            <a:avLst/>
+          </a:prstGeom>
+          <a:ln>
+            <a:solidFill>
+              <a:schemeClr val="accent6"/>
+            </a:solidFill>
+            <a:tailEnd type="triangle"/>
+          </a:ln>
+          <a:effectLst/>
+        </p:spPr>
+        <p:style>
+          <a:lnRef idx="2">
+            <a:schemeClr val="accent1"/>
+          </a:lnRef>
+          <a:fillRef idx="0">
+            <a:schemeClr val="accent1"/>
+          </a:fillRef>
+          <a:effectRef idx="1">
+            <a:schemeClr val="accent1"/>
+          </a:effectRef>
+          <a:fontRef idx="minor">
+            <a:schemeClr val="tx1"/>
+          </a:fontRef>
+        </p:style>
+      </p:cxnSp>
+      <p:cxnSp>
+        <p:nvCxnSpPr>
+          <p:cNvPr id="24" name="Elbow Connector 23">
+            <a:extLst>
+              <a:ext uri="{FF2B5EF4-FFF2-40B4-BE49-F238E27FC236}">
+                <a16:creationId xmlns:a16="http://schemas.microsoft.com/office/drawing/2014/main" id="{C6D643C2-3EE4-B147-B10E-BCE4D3790797}"/>
+              </a:ext>
+            </a:extLst>
+          </p:cNvPr>
+          <p:cNvCxnSpPr>
+            <a:cxnSpLocks/>
+            <a:stCxn id="49" idx="0"/>
+            <a:endCxn id="13" idx="2"/>
+          </p:cNvCxnSpPr>
+          <p:nvPr/>
+        </p:nvCxnSpPr>
+        <p:spPr>
+          <a:xfrm rot="16200000" flipV="1">
+            <a:off x="6479905" y="1863210"/>
+            <a:ext cx="929111" cy="1294801"/>
+          </a:xfrm>
+          <a:prstGeom prst="bentConnector3">
+            <a:avLst>
+              <a:gd name="adj1" fmla="val 50000"/>
+            </a:avLst>
+          </a:prstGeom>
+          <a:ln>
+            <a:solidFill>
+              <a:schemeClr val="accent6"/>
+            </a:solidFill>
+            <a:tailEnd type="triangle"/>
+          </a:ln>
+          <a:effectLst/>
+        </p:spPr>
+        <p:style>
+          <a:lnRef idx="2">
+            <a:schemeClr val="accent1"/>
+          </a:lnRef>
+          <a:fillRef idx="0">
+            <a:schemeClr val="accent1"/>
+          </a:fillRef>
+          <a:effectRef idx="1">
+            <a:schemeClr val="accent1"/>
+          </a:effectRef>
+          <a:fontRef idx="minor">
+            <a:schemeClr val="tx1"/>
+          </a:fontRef>
+        </p:style>
+      </p:cxnSp>
+      <p:sp>
+        <p:nvSpPr>
+          <p:cNvPr id="17" name="TextBox 16">
+            <a:extLst>
+              <a:ext uri="{FF2B5EF4-FFF2-40B4-BE49-F238E27FC236}">
+                <a16:creationId xmlns:a16="http://schemas.microsoft.com/office/drawing/2014/main" id="{1A0874EA-0F31-A94D-A496-B7D42FBB31A3}"/>
+              </a:ext>
+            </a:extLst>
+          </p:cNvPr>
+          <p:cNvSpPr txBox="1"/>
+          <p:nvPr/>
+        </p:nvSpPr>
+        <p:spPr>
+          <a:xfrm>
+            <a:off x="6369341" y="1637937"/>
+            <a:ext cx="482824" cy="207749"/>
+          </a:xfrm>
+          <a:prstGeom prst="rect">
+            <a:avLst/>
+          </a:prstGeom>
+          <a:noFill/>
+        </p:spPr>
+        <p:txBody>
+          <a:bodyPr wrap="none" rtlCol="0">
+            <a:spAutoFit/>
+          </a:bodyPr>
+          <a:lstStyle/>
+          <a:p>
+            <a:r>
+              <a:rPr lang="en-US" sz="750" b="1" dirty="0"/>
+              <a:t>orders</a:t>
+            </a:r>
+          </a:p>
+        </p:txBody>
+      </p:sp>
+      <p:sp>
+        <p:nvSpPr>
+          <p:cNvPr id="44" name="TextBox 43">
+            <a:extLst>
+              <a:ext uri="{FF2B5EF4-FFF2-40B4-BE49-F238E27FC236}">
+                <a16:creationId xmlns:a16="http://schemas.microsoft.com/office/drawing/2014/main" id="{E60BBBCD-AD4E-A94D-A062-4C15C724E8D6}"/>
+              </a:ext>
+            </a:extLst>
+          </p:cNvPr>
+          <p:cNvSpPr txBox="1"/>
+          <p:nvPr/>
+        </p:nvSpPr>
+        <p:spPr>
+          <a:xfrm>
+            <a:off x="2007036" y="1655652"/>
+            <a:ext cx="824265" cy="207749"/>
+          </a:xfrm>
+          <a:prstGeom prst="rect">
+            <a:avLst/>
+          </a:prstGeom>
+          <a:noFill/>
+        </p:spPr>
+        <p:txBody>
+          <a:bodyPr wrap="none" rtlCol="0">
+            <a:spAutoFit/>
+          </a:bodyPr>
+          <a:lstStyle/>
+          <a:p>
+            <a:r>
+              <a:rPr lang="en-US" sz="750" b="1" dirty="0"/>
+              <a:t>source.orders</a:t>
+            </a:r>
+          </a:p>
+        </p:txBody>
+      </p:sp>
+      <p:pic>
+        <p:nvPicPr>
+          <p:cNvPr id="41" name="Picture 40">
+            <a:extLst>
+              <a:ext uri="{FF2B5EF4-FFF2-40B4-BE49-F238E27FC236}">
+                <a16:creationId xmlns:a16="http://schemas.microsoft.com/office/drawing/2014/main" id="{56C25C81-9BFA-624C-9CA8-B1ED9F6886F8}"/>
+              </a:ext>
+            </a:extLst>
+          </p:cNvPr>
+          <p:cNvPicPr>
+            <a:picLocks noChangeAspect="1"/>
+          </p:cNvPicPr>
+          <p:nvPr/>
+        </p:nvPicPr>
+        <p:blipFill>
+          <a:blip r:embed="rId3">
+            <a:extLst>
+              <a:ext uri="{28A0092B-C50C-407E-A947-70E740481C1C}">
+                <a14:useLocalDpi xmlns:a14="http://schemas.microsoft.com/office/drawing/2010/main" val="0"/>
+              </a:ext>
+            </a:extLst>
+          </a:blip>
+          <a:stretch>
+            <a:fillRect/>
+          </a:stretch>
+        </p:blipFill>
+        <p:spPr>
+          <a:xfrm>
+            <a:off x="4945417" y="1503235"/>
+            <a:ext cx="191007" cy="252252"/>
+          </a:xfrm>
+          <a:prstGeom prst="rect">
+            <a:avLst/>
+          </a:prstGeom>
+        </p:spPr>
+      </p:pic>
+      <p:pic>
+        <p:nvPicPr>
+          <p:cNvPr id="42" name="Picture 41">
+            <a:extLst>
+              <a:ext uri="{FF2B5EF4-FFF2-40B4-BE49-F238E27FC236}">
+                <a16:creationId xmlns:a16="http://schemas.microsoft.com/office/drawing/2014/main" id="{68211D15-A32F-8943-9E1A-48A59F5DFCD2}"/>
+              </a:ext>
+            </a:extLst>
+          </p:cNvPr>
+          <p:cNvPicPr>
+            <a:picLocks noChangeAspect="1"/>
+          </p:cNvPicPr>
+          <p:nvPr/>
+        </p:nvPicPr>
+        <p:blipFill>
+          <a:blip r:embed="rId3">
+            <a:extLst>
+              <a:ext uri="{28A0092B-C50C-407E-A947-70E740481C1C}">
+                <a14:useLocalDpi xmlns:a14="http://schemas.microsoft.com/office/drawing/2010/main" val="0"/>
+              </a:ext>
+            </a:extLst>
+          </a:blip>
+          <a:stretch>
+            <a:fillRect/>
+          </a:stretch>
+        </p:blipFill>
+        <p:spPr>
+          <a:xfrm>
+            <a:off x="632701" y="1536885"/>
+            <a:ext cx="191007" cy="252252"/>
+          </a:xfrm>
+          <a:prstGeom prst="rect">
+            <a:avLst/>
+          </a:prstGeom>
+        </p:spPr>
+      </p:pic>
+      <p:pic>
+        <p:nvPicPr>
+          <p:cNvPr id="43" name="Picture 42">
+            <a:extLst>
+              <a:ext uri="{FF2B5EF4-FFF2-40B4-BE49-F238E27FC236}">
+                <a16:creationId xmlns:a16="http://schemas.microsoft.com/office/drawing/2014/main" id="{17C8EA92-3D3A-6646-A77F-C2E199089CD1}"/>
+              </a:ext>
+            </a:extLst>
+          </p:cNvPr>
+          <p:cNvPicPr>
+            <a:picLocks noChangeAspect="1"/>
+          </p:cNvPicPr>
+          <p:nvPr/>
+        </p:nvPicPr>
+        <p:blipFill>
+          <a:blip r:embed="rId4"/>
+          <a:stretch>
+            <a:fillRect/>
+          </a:stretch>
+        </p:blipFill>
+        <p:spPr>
+          <a:xfrm>
+            <a:off x="356381" y="3625830"/>
+            <a:ext cx="261023" cy="238649"/>
+          </a:xfrm>
+          <a:prstGeom prst="rect">
+            <a:avLst/>
+          </a:prstGeom>
+        </p:spPr>
+      </p:pic>
+      <p:sp>
+        <p:nvSpPr>
+          <p:cNvPr id="47" name="AutoShape 4">
+            <a:extLst>
+              <a:ext uri="{FF2B5EF4-FFF2-40B4-BE49-F238E27FC236}">
+                <a16:creationId xmlns:a16="http://schemas.microsoft.com/office/drawing/2014/main" id="{A00EABA6-52E6-B747-BCD6-7A397FE9059C}"/>
+              </a:ext>
+            </a:extLst>
+          </p:cNvPr>
+          <p:cNvSpPr>
+            <a:spLocks noChangeArrowheads="1"/>
+          </p:cNvSpPr>
+          <p:nvPr/>
+        </p:nvSpPr>
+        <p:spPr bwMode="auto">
+          <a:xfrm>
+            <a:off x="4945416" y="2790647"/>
+            <a:ext cx="3333325" cy="814403"/>
+          </a:xfrm>
+          <a:prstGeom prst="roundRect">
+            <a:avLst>
+              <a:gd name="adj" fmla="val 3325"/>
+            </a:avLst>
+          </a:prstGeom>
+          <a:noFill/>
+          <a:ln w="12700">
+            <a:solidFill>
+              <a:schemeClr val="accent3"/>
+            </a:solidFill>
+            <a:prstDash val="dash"/>
+            <a:round/>
+            <a:headEnd/>
+            <a:tailEnd/>
+          </a:ln>
+        </p:spPr>
+        <p:txBody>
+          <a:bodyPr lIns="0" tIns="0" rIns="0" bIns="0" anchor="b" anchorCtr="1"/>
+          <a:lstStyle/>
+          <a:p>
+            <a:pPr algn="ctr"/>
+            <a:r>
+              <a:rPr lang="en-US" sz="750" dirty="0" err="1"/>
+              <a:t>Openshift</a:t>
+            </a:r>
+            <a:r>
+              <a:rPr lang="en-US" sz="750" dirty="0"/>
+              <a:t> on Kubernetes Service</a:t>
+            </a:r>
+          </a:p>
+        </p:txBody>
+      </p:sp>
+      <p:pic>
+        <p:nvPicPr>
+          <p:cNvPr id="48" name="Picture 47">
+            <a:extLst>
+              <a:ext uri="{FF2B5EF4-FFF2-40B4-BE49-F238E27FC236}">
+                <a16:creationId xmlns:a16="http://schemas.microsoft.com/office/drawing/2014/main" id="{D9A1D566-7274-254B-B86D-75F32B5130BE}"/>
+              </a:ext>
+            </a:extLst>
+          </p:cNvPr>
+          <p:cNvPicPr>
+            <a:picLocks noChangeAspect="1"/>
+          </p:cNvPicPr>
+          <p:nvPr/>
+        </p:nvPicPr>
+        <p:blipFill>
+          <a:blip r:embed="rId4"/>
+          <a:stretch>
+            <a:fillRect/>
+          </a:stretch>
+        </p:blipFill>
+        <p:spPr>
+          <a:xfrm>
+            <a:off x="4938273" y="3386344"/>
+            <a:ext cx="261023" cy="238649"/>
+          </a:xfrm>
+          <a:prstGeom prst="rect">
+            <a:avLst/>
+          </a:prstGeom>
+        </p:spPr>
+      </p:pic>
+      <p:pic>
+        <p:nvPicPr>
+          <p:cNvPr id="50" name="Picture 49" descr="A picture containing sign, clock&#10;&#10;Description automatically generated">
+            <a:extLst>
+              <a:ext uri="{FF2B5EF4-FFF2-40B4-BE49-F238E27FC236}">
+                <a16:creationId xmlns:a16="http://schemas.microsoft.com/office/drawing/2014/main" id="{18D36C91-09E9-144D-BA4D-78F0917B3606}"/>
+              </a:ext>
+            </a:extLst>
+          </p:cNvPr>
+          <p:cNvPicPr>
+            <a:picLocks noChangeAspect="1"/>
+          </p:cNvPicPr>
+          <p:nvPr/>
+        </p:nvPicPr>
+        <p:blipFill>
+          <a:blip r:embed="rId5"/>
+          <a:stretch>
+            <a:fillRect/>
+          </a:stretch>
+        </p:blipFill>
+        <p:spPr>
+          <a:xfrm>
+            <a:off x="8002594" y="1071776"/>
+            <a:ext cx="397442" cy="351885"/>
+          </a:xfrm>
+          <a:prstGeom prst="rect">
+            <a:avLst/>
+          </a:prstGeom>
+        </p:spPr>
+      </p:pic>
+    </p:spTree>
+    <p:extLst>
+      <p:ext uri="{BB962C8B-B14F-4D97-AF65-F5344CB8AC3E}">
+        <p14:creationId xmlns:p14="http://schemas.microsoft.com/office/powerpoint/2010/main" val="616788447"/>
+      </p:ext>
+    </p:extLst>
+  </p:cSld>
+  <p:clrMapOvr>
+    <a:masterClrMapping/>
+  </p:clrMapOvr>
+</p:sld>
+</file>
+
+<file path=ppt/slides/slide2.xml><?xml version="1.0" encoding="utf-8"?>
+<p:sld xmlns:a="http://schemas.openxmlformats.org/drawingml/2006/main" xmlns:r="http://schemas.openxmlformats.org/officeDocument/2006/relationships" xmlns:p="http://schemas.openxmlformats.org/presentationml/2006/main">
+  <p:cSld>
+    <p:spTree>
+      <p:nvGrpSpPr>
+        <p:cNvPr id="1" name=""/>
+        <p:cNvGrpSpPr/>
+        <p:nvPr/>
+      </p:nvGrpSpPr>
+      <p:grpSpPr>
+        <a:xfrm>
+          <a:off x="0" y="0"/>
+          <a:ext cx="0" cy="0"/>
+          <a:chOff x="0" y="0"/>
+          <a:chExt cx="0" cy="0"/>
+        </a:xfrm>
+      </p:grpSpPr>
+      <p:sp>
+        <p:nvSpPr>
+          <p:cNvPr id="2" name="Title 1">
+            <a:extLst>
+              <a:ext uri="{FF2B5EF4-FFF2-40B4-BE49-F238E27FC236}">
+                <a16:creationId xmlns:a16="http://schemas.microsoft.com/office/drawing/2014/main" id="{7DD0824B-9D29-3747-BFBA-533EF2DF6980}"/>
+              </a:ext>
+            </a:extLst>
+          </p:cNvPr>
+          <p:cNvSpPr>
+            <a:spLocks noGrp="1"/>
+          </p:cNvSpPr>
+          <p:nvPr>
+            <p:ph type="title"/>
+          </p:nvPr>
+        </p:nvSpPr>
+        <p:spPr/>
+        <p:txBody>
+          <a:bodyPr/>
+          <a:lstStyle/>
+          <a:p>
+            <a:r>
+              <a:rPr lang="en-US" dirty="0"/>
+              <a:t>Performance Test</a:t>
+            </a:r>
+          </a:p>
+        </p:txBody>
+      </p:sp>
+      <p:sp>
+        <p:nvSpPr>
+          <p:cNvPr id="4" name="Slide Number Placeholder 3">
+            <a:extLst>
+              <a:ext uri="{FF2B5EF4-FFF2-40B4-BE49-F238E27FC236}">
+                <a16:creationId xmlns:a16="http://schemas.microsoft.com/office/drawing/2014/main" id="{223BEDBE-0C1E-504D-8318-92C91D8D607F}"/>
+              </a:ext>
+            </a:extLst>
+          </p:cNvPr>
+          <p:cNvSpPr>
+            <a:spLocks noGrp="1"/>
+          </p:cNvSpPr>
+          <p:nvPr>
+            <p:ph type="sldNum" sz="quarter" idx="12"/>
+          </p:nvPr>
+        </p:nvSpPr>
+        <p:spPr>
+          <a:xfrm>
+            <a:off x="11383211" y="6441552"/>
+            <a:ext cx="533845" cy="365125"/>
+          </a:xfrm>
+          <a:prstGeom prst="rect">
+            <a:avLst/>
+          </a:prstGeom>
+        </p:spPr>
+        <p:txBody>
+          <a:bodyPr vert="horz" lIns="91440" tIns="45720" rIns="91440" bIns="45720" rtlCol="0" anchor="ctr"/>
+          <a:lstStyle>
+            <a:defPPr>
+              <a:defRPr lang="en-US"/>
+            </a:defPPr>
+            <a:lvl1pPr algn="r" rtl="0" eaLnBrk="0" fontAlgn="base" hangingPunct="0">
+              <a:spcBef>
+                <a:spcPct val="0"/>
+              </a:spcBef>
+              <a:spcAft>
+                <a:spcPct val="0"/>
+              </a:spcAft>
+              <a:defRPr sz="1200" kern="1200">
+                <a:solidFill>
+                  <a:schemeClr val="tx1"/>
+                </a:solidFill>
+                <a:latin typeface="Arial" panose="020B0604020202020204" pitchFamily="34" charset="0"/>
+                <a:ea typeface="+mn-ea"/>
+                <a:cs typeface="Arial" panose="020B0604020202020204" pitchFamily="34" charset="0"/>
+              </a:defRPr>
+            </a:lvl1pPr>
+            <a:lvl2pPr marL="457071" algn="l" rtl="0" eaLnBrk="0" fontAlgn="base" hangingPunct="0">
+              <a:spcBef>
+                <a:spcPct val="0"/>
+              </a:spcBef>
+              <a:spcAft>
+                <a:spcPct val="0"/>
+              </a:spcAft>
+              <a:defRPr kern="1200">
+                <a:solidFill>
+                  <a:schemeClr val="tx1"/>
+                </a:solidFill>
+                <a:latin typeface="Arial" panose="020B0604020202020204" pitchFamily="34" charset="0"/>
+                <a:ea typeface="+mn-ea"/>
+                <a:cs typeface="Arial" panose="020B0604020202020204" pitchFamily="34" charset="0"/>
+              </a:defRPr>
+            </a:lvl2pPr>
+            <a:lvl3pPr marL="914150" algn="l" rtl="0" eaLnBrk="0" fontAlgn="base" hangingPunct="0">
+              <a:spcBef>
+                <a:spcPct val="0"/>
+              </a:spcBef>
+              <a:spcAft>
+                <a:spcPct val="0"/>
+              </a:spcAft>
+              <a:defRPr kern="1200">
+                <a:solidFill>
+                  <a:schemeClr val="tx1"/>
+                </a:solidFill>
+                <a:latin typeface="Arial" panose="020B0604020202020204" pitchFamily="34" charset="0"/>
+                <a:ea typeface="+mn-ea"/>
+                <a:cs typeface="Arial" panose="020B0604020202020204" pitchFamily="34" charset="0"/>
+              </a:defRPr>
+            </a:lvl3pPr>
+            <a:lvl4pPr marL="1371226" algn="l" rtl="0" eaLnBrk="0" fontAlgn="base" hangingPunct="0">
+              <a:spcBef>
+                <a:spcPct val="0"/>
+              </a:spcBef>
+              <a:spcAft>
+                <a:spcPct val="0"/>
+              </a:spcAft>
+              <a:defRPr kern="1200">
+                <a:solidFill>
+                  <a:schemeClr val="tx1"/>
+                </a:solidFill>
+                <a:latin typeface="Arial" panose="020B0604020202020204" pitchFamily="34" charset="0"/>
+                <a:ea typeface="+mn-ea"/>
+                <a:cs typeface="Arial" panose="020B0604020202020204" pitchFamily="34" charset="0"/>
+              </a:defRPr>
+            </a:lvl4pPr>
+            <a:lvl5pPr marL="1828301" algn="l" rtl="0" eaLnBrk="0" fontAlgn="base" hangingPunct="0">
+              <a:spcBef>
+                <a:spcPct val="0"/>
+              </a:spcBef>
+              <a:spcAft>
+                <a:spcPct val="0"/>
+              </a:spcAft>
+              <a:defRPr kern="1200">
+                <a:solidFill>
+                  <a:schemeClr val="tx1"/>
+                </a:solidFill>
+                <a:latin typeface="Arial" panose="020B0604020202020204" pitchFamily="34" charset="0"/>
+                <a:ea typeface="+mn-ea"/>
+                <a:cs typeface="Arial" panose="020B0604020202020204" pitchFamily="34" charset="0"/>
+              </a:defRPr>
+            </a:lvl5pPr>
+            <a:lvl6pPr marL="2285382" algn="l" defTabSz="914150" rtl="0" eaLnBrk="1" latinLnBrk="0" hangingPunct="1">
+              <a:defRPr kern="1200">
+                <a:solidFill>
+                  <a:schemeClr val="tx1"/>
+                </a:solidFill>
+                <a:latin typeface="Arial" panose="020B0604020202020204" pitchFamily="34" charset="0"/>
+                <a:ea typeface="+mn-ea"/>
+                <a:cs typeface="Arial" panose="020B0604020202020204" pitchFamily="34" charset="0"/>
+              </a:defRPr>
+            </a:lvl6pPr>
+            <a:lvl7pPr marL="2742450" algn="l" defTabSz="914150" rtl="0" eaLnBrk="1" latinLnBrk="0" hangingPunct="1">
+              <a:defRPr kern="1200">
+                <a:solidFill>
+                  <a:schemeClr val="tx1"/>
+                </a:solidFill>
+                <a:latin typeface="Arial" panose="020B0604020202020204" pitchFamily="34" charset="0"/>
+                <a:ea typeface="+mn-ea"/>
+                <a:cs typeface="Arial" panose="020B0604020202020204" pitchFamily="34" charset="0"/>
+              </a:defRPr>
+            </a:lvl7pPr>
+            <a:lvl8pPr marL="3199520" algn="l" defTabSz="914150" rtl="0" eaLnBrk="1" latinLnBrk="0" hangingPunct="1">
+              <a:defRPr kern="1200">
+                <a:solidFill>
+                  <a:schemeClr val="tx1"/>
+                </a:solidFill>
+                <a:latin typeface="Arial" panose="020B0604020202020204" pitchFamily="34" charset="0"/>
+                <a:ea typeface="+mn-ea"/>
+                <a:cs typeface="Arial" panose="020B0604020202020204" pitchFamily="34" charset="0"/>
+              </a:defRPr>
+            </a:lvl8pPr>
+            <a:lvl9pPr marL="3656591" algn="l" defTabSz="914150" rtl="0" eaLnBrk="1" latinLnBrk="0" hangingPunct="1">
+              <a:defRPr kern="1200">
+                <a:solidFill>
+                  <a:schemeClr val="tx1"/>
+                </a:solidFill>
+                <a:latin typeface="Arial" panose="020B0604020202020204" pitchFamily="34" charset="0"/>
+                <a:ea typeface="+mn-ea"/>
+                <a:cs typeface="Arial" panose="020B0604020202020204" pitchFamily="34" charset="0"/>
+              </a:defRPr>
+            </a:lvl9pPr>
+          </a:lstStyle>
+          <a:p>
+            <a:fld id="{E9549862-13E2-C34D-815E-8545BD36FC59}" type="slidenum">
+              <a:rPr lang="en-US" smtClean="0">
+                <a:solidFill>
+                  <a:srgbClr val="6D7777"/>
+                </a:solidFill>
+              </a:rPr>
+              <a:pPr/>
+              <a:t>2</a:t>
             </a:fld>
             <a:endParaRPr lang="en-US">
               <a:solidFill>
@@ -6965,7 +9358,7 @@
     </p:spTree>
     <p:extLst>
       <p:ext uri="{BB962C8B-B14F-4D97-AF65-F5344CB8AC3E}">
-        <p14:creationId xmlns:p14="http://schemas.microsoft.com/office/powerpoint/2010/main" val="616788447"/>
+        <p14:creationId xmlns:p14="http://schemas.microsoft.com/office/powerpoint/2010/main" val="3317554367"/>
       </p:ext>
     </p:extLst>
   </p:cSld>
@@ -6975,7 +9368,7 @@
 </p:sld>
 </file>
 
-<file path=ppt/slides/slide2.xml><?xml version="1.0" encoding="utf-8"?>
+<file path=ppt/slides/slide3.xml><?xml version="1.0" encoding="utf-8"?>
 <p:sld xmlns:a="http://schemas.openxmlformats.org/drawingml/2006/main" xmlns:r="http://schemas.openxmlformats.org/officeDocument/2006/relationships" xmlns:p="http://schemas.openxmlformats.org/presentationml/2006/main">
   <p:cSld>
     <p:spTree>
@@ -7049,7 +9442,7 @@
                 </a:solidFill>
               </a:rPr>
               <a:pPr/>
-              <a:t>2</a:t>
+              <a:t>3</a:t>
             </a:fld>
             <a:endParaRPr lang="en-US">
               <a:solidFill>
@@ -8347,7 +10740,7 @@
 </p:sld>
 </file>
 
-<file path=ppt/slides/slide3.xml><?xml version="1.0" encoding="utf-8"?>
+<file path=ppt/slides/slide4.xml><?xml version="1.0" encoding="utf-8"?>
 <p:sld xmlns:a="http://schemas.openxmlformats.org/drawingml/2006/main" xmlns:r="http://schemas.openxmlformats.org/officeDocument/2006/relationships" xmlns:p="http://schemas.openxmlformats.org/presentationml/2006/main">
   <p:cSld>
     <p:spTree>
@@ -8421,7 +10814,7 @@
                 </a:solidFill>
               </a:rPr>
               <a:pPr/>
-              <a:t>3</a:t>
+              <a:t>4</a:t>
             </a:fld>
             <a:endParaRPr lang="en-US">
               <a:solidFill>
@@ -10540,7 +12933,7 @@
 </p:sld>
 </file>
 
-<file path=ppt/slides/slide4.xml><?xml version="1.0" encoding="utf-8"?>
+<file path=ppt/slides/slide5.xml><?xml version="1.0" encoding="utf-8"?>
 <p:sld xmlns:a="http://schemas.openxmlformats.org/drawingml/2006/main" xmlns:r="http://schemas.openxmlformats.org/officeDocument/2006/relationships" xmlns:p="http://schemas.openxmlformats.org/presentationml/2006/main">
   <p:cSld>
     <p:spTree>
@@ -10614,7 +13007,7 @@
                 </a:solidFill>
               </a:rPr>
               <a:pPr/>
-              <a:t>4</a:t>
+              <a:t>5</a:t>
             </a:fld>
             <a:endParaRPr lang="en-US">
               <a:solidFill>
@@ -14116,7 +16509,7 @@
 </p:sld>
 </file>
 
-<file path=ppt/slides/slide5.xml><?xml version="1.0" encoding="utf-8"?>
+<file path=ppt/slides/slide6.xml><?xml version="1.0" encoding="utf-8"?>
 <p:sld xmlns:a="http://schemas.openxmlformats.org/drawingml/2006/main" xmlns:r="http://schemas.openxmlformats.org/officeDocument/2006/relationships" xmlns:p="http://schemas.openxmlformats.org/presentationml/2006/main">
   <p:cSld>
     <p:spTree>
@@ -14190,7 +16583,7 @@
                 </a:solidFill>
               </a:rPr>
               <a:pPr/>
-              <a:t>5</a:t>
+              <a:t>6</a:t>
             </a:fld>
             <a:endParaRPr lang="en-US">
               <a:solidFill>
@@ -22686,7 +25079,7 @@
 </p:sld>
 </file>
 
-<file path=ppt/slides/slide6.xml><?xml version="1.0" encoding="utf-8"?>
+<file path=ppt/slides/slide7.xml><?xml version="1.0" encoding="utf-8"?>
 <p:sld xmlns:a="http://schemas.openxmlformats.org/drawingml/2006/main" xmlns:r="http://schemas.openxmlformats.org/officeDocument/2006/relationships" xmlns:p="http://schemas.openxmlformats.org/presentationml/2006/main">
   <p:cSld>
     <p:spTree>
@@ -22760,7 +25153,7 @@
                 </a:solidFill>
               </a:rPr>
               <a:pPr/>
-              <a:t>6</a:t>
+              <a:t>7</a:t>
             </a:fld>
             <a:endParaRPr lang="en-US">
               <a:solidFill>
@@ -31231,7 +33624,7 @@
 </p:sld>
 </file>
 
-<file path=ppt/slides/slide7.xml><?xml version="1.0" encoding="utf-8"?>
+<file path=ppt/slides/slide8.xml><?xml version="1.0" encoding="utf-8"?>
 <p:sld xmlns:a="http://schemas.openxmlformats.org/drawingml/2006/main" xmlns:r="http://schemas.openxmlformats.org/officeDocument/2006/relationships" xmlns:p="http://schemas.openxmlformats.org/presentationml/2006/main">
   <p:cSld>
     <p:spTree>
@@ -31314,7 +33707,7 @@
                 </a:solidFill>
               </a:rPr>
               <a:pPr/>
-              <a:t>7</a:t>
+              <a:t>8</a:t>
             </a:fld>
             <a:endParaRPr lang="en-US">
               <a:solidFill>

</xml_diff>